<commit_message>
Modifications to programmable scheduling lecture
</commit_message>
<xml_diff>
--- a/ex/552-F19/lectures/18-programmable-scheduling.pptx
+++ b/ex/552-F19/lectures/18-programmable-scheduling.pptx
@@ -5,43 +5,42 @@
     <p:sldMasterId id="2147483648" r:id="rId1"/>
   </p:sldMasterIdLst>
   <p:notesMasterIdLst>
-    <p:notesMasterId r:id="rId36"/>
+    <p:notesMasterId r:id="rId35"/>
   </p:notesMasterIdLst>
   <p:sldIdLst>
     <p:sldId id="384" r:id="rId2"/>
-    <p:sldId id="385" r:id="rId3"/>
-    <p:sldId id="307" r:id="rId4"/>
-    <p:sldId id="413" r:id="rId5"/>
-    <p:sldId id="309" r:id="rId6"/>
-    <p:sldId id="391" r:id="rId7"/>
-    <p:sldId id="392" r:id="rId8"/>
-    <p:sldId id="393" r:id="rId9"/>
-    <p:sldId id="394" r:id="rId10"/>
-    <p:sldId id="396" r:id="rId11"/>
-    <p:sldId id="395" r:id="rId12"/>
-    <p:sldId id="398" r:id="rId13"/>
-    <p:sldId id="399" r:id="rId14"/>
-    <p:sldId id="400" r:id="rId15"/>
-    <p:sldId id="401" r:id="rId16"/>
-    <p:sldId id="407" r:id="rId17"/>
-    <p:sldId id="414" r:id="rId18"/>
-    <p:sldId id="408" r:id="rId19"/>
-    <p:sldId id="402" r:id="rId20"/>
-    <p:sldId id="418" r:id="rId21"/>
-    <p:sldId id="415" r:id="rId22"/>
-    <p:sldId id="416" r:id="rId23"/>
-    <p:sldId id="417" r:id="rId24"/>
-    <p:sldId id="419" r:id="rId25"/>
-    <p:sldId id="420" r:id="rId26"/>
-    <p:sldId id="421" r:id="rId27"/>
-    <p:sldId id="425" r:id="rId28"/>
-    <p:sldId id="422" r:id="rId29"/>
-    <p:sldId id="423" r:id="rId30"/>
-    <p:sldId id="424" r:id="rId31"/>
-    <p:sldId id="405" r:id="rId32"/>
-    <p:sldId id="409" r:id="rId33"/>
-    <p:sldId id="410" r:id="rId34"/>
-    <p:sldId id="412" r:id="rId35"/>
+    <p:sldId id="307" r:id="rId3"/>
+    <p:sldId id="413" r:id="rId4"/>
+    <p:sldId id="309" r:id="rId5"/>
+    <p:sldId id="391" r:id="rId6"/>
+    <p:sldId id="392" r:id="rId7"/>
+    <p:sldId id="393" r:id="rId8"/>
+    <p:sldId id="394" r:id="rId9"/>
+    <p:sldId id="396" r:id="rId10"/>
+    <p:sldId id="395" r:id="rId11"/>
+    <p:sldId id="398" r:id="rId12"/>
+    <p:sldId id="399" r:id="rId13"/>
+    <p:sldId id="400" r:id="rId14"/>
+    <p:sldId id="401" r:id="rId15"/>
+    <p:sldId id="407" r:id="rId16"/>
+    <p:sldId id="414" r:id="rId17"/>
+    <p:sldId id="408" r:id="rId18"/>
+    <p:sldId id="402" r:id="rId19"/>
+    <p:sldId id="418" r:id="rId20"/>
+    <p:sldId id="415" r:id="rId21"/>
+    <p:sldId id="416" r:id="rId22"/>
+    <p:sldId id="417" r:id="rId23"/>
+    <p:sldId id="419" r:id="rId24"/>
+    <p:sldId id="420" r:id="rId25"/>
+    <p:sldId id="421" r:id="rId26"/>
+    <p:sldId id="425" r:id="rId27"/>
+    <p:sldId id="422" r:id="rId28"/>
+    <p:sldId id="423" r:id="rId29"/>
+    <p:sldId id="424" r:id="rId30"/>
+    <p:sldId id="405" r:id="rId31"/>
+    <p:sldId id="409" r:id="rId32"/>
+    <p:sldId id="410" r:id="rId33"/>
+    <p:sldId id="412" r:id="rId34"/>
   </p:sldIdLst>
   <p:sldSz cx="12192000" cy="6858000"/>
   <p:notesSz cx="6858000" cy="9144000"/>
@@ -3772,531 +3771,6 @@
           <a:chExt cx="0" cy="0"/>
         </a:xfrm>
       </p:grpSpPr>
-      <p:pic>
-        <p:nvPicPr>
-          <p:cNvPr id="5" name="Picture 4"/>
-          <p:cNvPicPr>
-            <a:picLocks noChangeAspect="1"/>
-          </p:cNvPicPr>
-          <p:nvPr/>
-        </p:nvPicPr>
-        <p:blipFill>
-          <a:blip r:embed="rId2">
-            <a:extLst>
-              <a:ext uri="{28A0092B-C50C-407E-A947-70E740481C1C}">
-                <a14:useLocalDpi xmlns:a14="http://schemas.microsoft.com/office/drawing/2010/main" val="0"/>
-              </a:ext>
-            </a:extLst>
-          </a:blip>
-          <a:stretch>
-            <a:fillRect/>
-          </a:stretch>
-        </p:blipFill>
-        <p:spPr>
-          <a:xfrm rot="5400000">
-            <a:off x="7535079" y="3494251"/>
-            <a:ext cx="1049475" cy="1907109"/>
-          </a:xfrm>
-          <a:prstGeom prst="rect">
-            <a:avLst/>
-          </a:prstGeom>
-        </p:spPr>
-      </p:pic>
-      <p:pic>
-        <p:nvPicPr>
-          <p:cNvPr id="4" name="Picture 3"/>
-          <p:cNvPicPr>
-            <a:picLocks noChangeAspect="1"/>
-          </p:cNvPicPr>
-          <p:nvPr/>
-        </p:nvPicPr>
-        <p:blipFill>
-          <a:blip r:embed="rId2">
-            <a:extLst>
-              <a:ext uri="{28A0092B-C50C-407E-A947-70E740481C1C}">
-                <a14:useLocalDpi xmlns:a14="http://schemas.microsoft.com/office/drawing/2010/main" val="0"/>
-              </a:ext>
-            </a:extLst>
-          </a:blip>
-          <a:stretch>
-            <a:fillRect/>
-          </a:stretch>
-        </p:blipFill>
-        <p:spPr>
-          <a:xfrm rot="5400000">
-            <a:off x="1708353" y="4247536"/>
-            <a:ext cx="2492476" cy="2492476"/>
-          </a:xfrm>
-          <a:prstGeom prst="rect">
-            <a:avLst/>
-          </a:prstGeom>
-        </p:spPr>
-      </p:pic>
-      <p:sp>
-        <p:nvSpPr>
-          <p:cNvPr id="2" name="Title 1"/>
-          <p:cNvSpPr>
-            <a:spLocks noGrp="1"/>
-          </p:cNvSpPr>
-          <p:nvPr>
-            <p:ph type="title"/>
-          </p:nvPr>
-        </p:nvSpPr>
-        <p:spPr/>
-        <p:txBody>
-          <a:bodyPr/>
-          <a:lstStyle/>
-          <a:p>
-            <a:r>
-              <a:rPr lang="en-US" dirty="0"/>
-              <a:t>Max-min fairness for a single resource</a:t>
-            </a:r>
-          </a:p>
-        </p:txBody>
-      </p:sp>
-      <p:sp>
-        <p:nvSpPr>
-          <p:cNvPr id="3" name="Content Placeholder 2"/>
-          <p:cNvSpPr>
-            <a:spLocks noGrp="1"/>
-          </p:cNvSpPr>
-          <p:nvPr>
-            <p:ph idx="1"/>
-          </p:nvPr>
-        </p:nvSpPr>
-        <p:spPr>
-          <a:xfrm>
-            <a:off x="838200" y="1825625"/>
-            <a:ext cx="10990006" cy="4351338"/>
-          </a:xfrm>
-        </p:spPr>
-        <p:txBody>
-          <a:bodyPr/>
-          <a:lstStyle/>
-          <a:p>
-            <a:r>
-              <a:rPr lang="en-US" altLang="en-US" dirty="0">
-                <a:solidFill>
-                  <a:srgbClr val="C00000"/>
-                </a:solidFill>
-                <a:ea typeface="ＭＳ Ｐゴシック" charset="-128"/>
-              </a:rPr>
-              <a:t>Progressive filling algorithm </a:t>
-            </a:r>
-            <a:r>
-              <a:rPr lang="en-US" altLang="en-US" dirty="0">
-                <a:ea typeface="ＭＳ Ｐゴシック" charset="-128"/>
-              </a:rPr>
-              <a:t>(also called </a:t>
-            </a:r>
-            <a:r>
-              <a:rPr lang="en-US" altLang="en-US" dirty="0" err="1">
-                <a:solidFill>
-                  <a:srgbClr val="C00000"/>
-                </a:solidFill>
-                <a:ea typeface="ＭＳ Ｐゴシック" charset="-128"/>
-              </a:rPr>
-              <a:t>waterfilling</a:t>
-            </a:r>
-            <a:r>
-              <a:rPr lang="en-US" altLang="en-US" dirty="0">
-                <a:solidFill>
-                  <a:srgbClr val="C00000"/>
-                </a:solidFill>
-                <a:ea typeface="ＭＳ Ｐゴシック" charset="-128"/>
-              </a:rPr>
-              <a:t>)</a:t>
-            </a:r>
-          </a:p>
-          <a:p>
-            <a:pPr lvl="1"/>
-            <a:r>
-              <a:rPr lang="en-US" altLang="en-US" dirty="0"/>
-              <a:t>Grow all rates until some users stop having demand</a:t>
-            </a:r>
-          </a:p>
-          <a:p>
-            <a:pPr lvl="1"/>
-            <a:r>
-              <a:rPr lang="en-US" altLang="en-US" dirty="0"/>
-              <a:t>Continue increasing all remaining rates until link is fully utilized</a:t>
-            </a:r>
-          </a:p>
-          <a:p>
-            <a:endParaRPr lang="en-US" dirty="0"/>
-          </a:p>
-          <a:p>
-            <a:r>
-              <a:rPr lang="en-US" dirty="0"/>
-              <a:t>If all users have elastic demands, single resource shared evenly</a:t>
-            </a:r>
-          </a:p>
-        </p:txBody>
-      </p:sp>
-      <p:pic>
-        <p:nvPicPr>
-          <p:cNvPr id="6" name="Picture 5"/>
-          <p:cNvPicPr>
-            <a:picLocks noChangeAspect="1"/>
-          </p:cNvPicPr>
-          <p:nvPr/>
-        </p:nvPicPr>
-        <p:blipFill>
-          <a:blip r:embed="rId2">
-            <a:extLst>
-              <a:ext uri="{28A0092B-C50C-407E-A947-70E740481C1C}">
-                <a14:useLocalDpi xmlns:a14="http://schemas.microsoft.com/office/drawing/2010/main" val="0"/>
-              </a:ext>
-            </a:extLst>
-          </a:blip>
-          <a:stretch>
-            <a:fillRect/>
-          </a:stretch>
-        </p:blipFill>
-        <p:spPr>
-          <a:xfrm rot="5400000">
-            <a:off x="7535079" y="4330992"/>
-            <a:ext cx="1049475" cy="1907109"/>
-          </a:xfrm>
-          <a:prstGeom prst="rect">
-            <a:avLst/>
-          </a:prstGeom>
-        </p:spPr>
-      </p:pic>
-      <p:pic>
-        <p:nvPicPr>
-          <p:cNvPr id="7" name="Picture 6"/>
-          <p:cNvPicPr>
-            <a:picLocks noChangeAspect="1"/>
-          </p:cNvPicPr>
-          <p:nvPr/>
-        </p:nvPicPr>
-        <p:blipFill>
-          <a:blip r:embed="rId2">
-            <a:extLst>
-              <a:ext uri="{28A0092B-C50C-407E-A947-70E740481C1C}">
-                <a14:useLocalDpi xmlns:a14="http://schemas.microsoft.com/office/drawing/2010/main" val="0"/>
-              </a:ext>
-            </a:extLst>
-          </a:blip>
-          <a:stretch>
-            <a:fillRect/>
-          </a:stretch>
-        </p:blipFill>
-        <p:spPr>
-          <a:xfrm rot="5400000">
-            <a:off x="7535079" y="5300927"/>
-            <a:ext cx="1049475" cy="1907109"/>
-          </a:xfrm>
-          <a:prstGeom prst="rect">
-            <a:avLst/>
-          </a:prstGeom>
-        </p:spPr>
-      </p:pic>
-      <p:sp>
-        <p:nvSpPr>
-          <p:cNvPr id="8" name="TextBox 7"/>
-          <p:cNvSpPr txBox="1"/>
-          <p:nvPr/>
-        </p:nvSpPr>
-        <p:spPr>
-          <a:xfrm>
-            <a:off x="1991032" y="6131409"/>
-            <a:ext cx="1976284" cy="492443"/>
-          </a:xfrm>
-          <a:prstGeom prst="rect">
-            <a:avLst/>
-          </a:prstGeom>
-          <a:noFill/>
-        </p:spPr>
-        <p:txBody>
-          <a:bodyPr wrap="square" rtlCol="0">
-            <a:spAutoFit/>
-          </a:bodyPr>
-          <a:lstStyle/>
-          <a:p>
-            <a:pPr algn="ctr"/>
-            <a:r>
-              <a:rPr lang="en-US" sz="2600" dirty="0">
-                <a:latin typeface="Helvetica" pitchFamily="2" charset="0"/>
-              </a:rPr>
-              <a:t>Link rate L</a:t>
-            </a:r>
-          </a:p>
-        </p:txBody>
-      </p:sp>
-      <p:sp>
-        <p:nvSpPr>
-          <p:cNvPr id="9" name="TextBox 8"/>
-          <p:cNvSpPr txBox="1"/>
-          <p:nvPr/>
-        </p:nvSpPr>
-        <p:spPr>
-          <a:xfrm>
-            <a:off x="9598738" y="4318402"/>
-            <a:ext cx="2081981" cy="492443"/>
-          </a:xfrm>
-          <a:prstGeom prst="rect">
-            <a:avLst/>
-          </a:prstGeom>
-          <a:noFill/>
-        </p:spPr>
-        <p:txBody>
-          <a:bodyPr wrap="square" rtlCol="0">
-            <a:spAutoFit/>
-          </a:bodyPr>
-          <a:lstStyle/>
-          <a:p>
-            <a:pPr algn="ctr"/>
-            <a:r>
-              <a:rPr lang="en-US" sz="2600" dirty="0">
-                <a:latin typeface="Helvetica" pitchFamily="2" charset="0"/>
-              </a:rPr>
-              <a:t>Link </a:t>
-            </a:r>
-            <a:r>
-              <a:rPr lang="en-US" sz="2600">
-                <a:latin typeface="Helvetica" pitchFamily="2" charset="0"/>
-              </a:rPr>
-              <a:t>rate L/N</a:t>
-            </a:r>
-            <a:endParaRPr lang="en-US" sz="2600" dirty="0">
-              <a:latin typeface="Helvetica" pitchFamily="2" charset="0"/>
-            </a:endParaRPr>
-          </a:p>
-        </p:txBody>
-      </p:sp>
-      <p:sp>
-        <p:nvSpPr>
-          <p:cNvPr id="10" name="TextBox 9"/>
-          <p:cNvSpPr txBox="1"/>
-          <p:nvPr/>
-        </p:nvSpPr>
-        <p:spPr>
-          <a:xfrm>
-            <a:off x="9598737" y="5192514"/>
-            <a:ext cx="2081981" cy="492443"/>
-          </a:xfrm>
-          <a:prstGeom prst="rect">
-            <a:avLst/>
-          </a:prstGeom>
-          <a:noFill/>
-        </p:spPr>
-        <p:txBody>
-          <a:bodyPr wrap="square" rtlCol="0">
-            <a:spAutoFit/>
-          </a:bodyPr>
-          <a:lstStyle/>
-          <a:p>
-            <a:pPr algn="ctr"/>
-            <a:r>
-              <a:rPr lang="en-US" sz="2600" dirty="0">
-                <a:latin typeface="Helvetica" pitchFamily="2" charset="0"/>
-              </a:rPr>
-              <a:t>Link </a:t>
-            </a:r>
-            <a:r>
-              <a:rPr lang="en-US" sz="2600">
-                <a:latin typeface="Helvetica" pitchFamily="2" charset="0"/>
-              </a:rPr>
-              <a:t>rate L/N</a:t>
-            </a:r>
-            <a:endParaRPr lang="en-US" sz="2600" dirty="0">
-              <a:latin typeface="Helvetica" pitchFamily="2" charset="0"/>
-            </a:endParaRPr>
-          </a:p>
-        </p:txBody>
-      </p:sp>
-      <p:sp>
-        <p:nvSpPr>
-          <p:cNvPr id="11" name="TextBox 10"/>
-          <p:cNvSpPr txBox="1"/>
-          <p:nvPr/>
-        </p:nvSpPr>
-        <p:spPr>
-          <a:xfrm>
-            <a:off x="9598737" y="6108483"/>
-            <a:ext cx="2081981" cy="492443"/>
-          </a:xfrm>
-          <a:prstGeom prst="rect">
-            <a:avLst/>
-          </a:prstGeom>
-          <a:noFill/>
-        </p:spPr>
-        <p:txBody>
-          <a:bodyPr wrap="square" rtlCol="0">
-            <a:spAutoFit/>
-          </a:bodyPr>
-          <a:lstStyle/>
-          <a:p>
-            <a:pPr algn="ctr"/>
-            <a:r>
-              <a:rPr lang="en-US" sz="2600" dirty="0">
-                <a:latin typeface="Helvetica" pitchFamily="2" charset="0"/>
-              </a:rPr>
-              <a:t>Link </a:t>
-            </a:r>
-            <a:r>
-              <a:rPr lang="en-US" sz="2600">
-                <a:latin typeface="Helvetica" pitchFamily="2" charset="0"/>
-              </a:rPr>
-              <a:t>rate L/N</a:t>
-            </a:r>
-            <a:endParaRPr lang="en-US" sz="2600" dirty="0">
-              <a:latin typeface="Helvetica" pitchFamily="2" charset="0"/>
-            </a:endParaRPr>
-          </a:p>
-        </p:txBody>
-      </p:sp>
-      <p:sp>
-        <p:nvSpPr>
-          <p:cNvPr id="12" name="Right Arrow 11"/>
-          <p:cNvSpPr/>
-          <p:nvPr/>
-        </p:nvSpPr>
-        <p:spPr>
-          <a:xfrm>
-            <a:off x="5014452" y="5401594"/>
-            <a:ext cx="1318751" cy="656299"/>
-          </a:xfrm>
-          <a:prstGeom prst="rightArrow">
-            <a:avLst/>
-          </a:prstGeom>
-          <a:noFill/>
-          <a:ln w="50800">
-            <a:solidFill>
-              <a:schemeClr val="tx1"/>
-            </a:solidFill>
-          </a:ln>
-        </p:spPr>
-        <p:style>
-          <a:lnRef idx="2">
-            <a:schemeClr val="accent1">
-              <a:shade val="50000"/>
-            </a:schemeClr>
-          </a:lnRef>
-          <a:fillRef idx="1">
-            <a:schemeClr val="accent1"/>
-          </a:fillRef>
-          <a:effectRef idx="0">
-            <a:schemeClr val="accent1"/>
-          </a:effectRef>
-          <a:fontRef idx="minor">
-            <a:schemeClr val="lt1"/>
-          </a:fontRef>
-        </p:style>
-        <p:txBody>
-          <a:bodyPr rtlCol="0" anchor="ctr"/>
-          <a:lstStyle/>
-          <a:p>
-            <a:pPr algn="ctr"/>
-            <a:endParaRPr lang="en-US"/>
-          </a:p>
-        </p:txBody>
-      </p:sp>
-      <p:sp>
-        <p:nvSpPr>
-          <p:cNvPr id="13" name="TextBox 12"/>
-          <p:cNvSpPr txBox="1"/>
-          <p:nvPr/>
-        </p:nvSpPr>
-        <p:spPr>
-          <a:xfrm>
-            <a:off x="4689987" y="4468761"/>
-            <a:ext cx="1843548" cy="892552"/>
-          </a:xfrm>
-          <a:prstGeom prst="rect">
-            <a:avLst/>
-          </a:prstGeom>
-          <a:noFill/>
-        </p:spPr>
-        <p:txBody>
-          <a:bodyPr wrap="square" rtlCol="0">
-            <a:spAutoFit/>
-          </a:bodyPr>
-          <a:lstStyle/>
-          <a:p>
-            <a:pPr algn="ctr"/>
-            <a:r>
-              <a:rPr lang="en-US" sz="2600" dirty="0">
-                <a:latin typeface="Helvetica" charset="0"/>
-                <a:ea typeface="Helvetica" charset="0"/>
-                <a:cs typeface="Helvetica" charset="0"/>
-              </a:rPr>
-              <a:t>N elastic users</a:t>
-            </a:r>
-          </a:p>
-        </p:txBody>
-      </p:sp>
-      <p:sp>
-        <p:nvSpPr>
-          <p:cNvPr id="14" name="TextBox 13"/>
-          <p:cNvSpPr txBox="1"/>
-          <p:nvPr/>
-        </p:nvSpPr>
-        <p:spPr>
-          <a:xfrm>
-            <a:off x="7369269" y="5650280"/>
-            <a:ext cx="1410584" cy="492443"/>
-          </a:xfrm>
-          <a:prstGeom prst="rect">
-            <a:avLst/>
-          </a:prstGeom>
-          <a:noFill/>
-        </p:spPr>
-        <p:txBody>
-          <a:bodyPr wrap="square" rtlCol="0">
-            <a:spAutoFit/>
-          </a:bodyPr>
-          <a:lstStyle/>
-          <a:p>
-            <a:pPr algn="ctr"/>
-            <a:r>
-              <a:rPr lang="is-IS" sz="2600">
-                <a:latin typeface="Helvetica" charset="0"/>
-                <a:ea typeface="Helvetica" charset="0"/>
-                <a:cs typeface="Helvetica" charset="0"/>
-              </a:rPr>
-              <a:t>…</a:t>
-            </a:r>
-            <a:endParaRPr lang="en-US" sz="2600" dirty="0">
-              <a:latin typeface="Helvetica" charset="0"/>
-              <a:ea typeface="Helvetica" charset="0"/>
-              <a:cs typeface="Helvetica" charset="0"/>
-            </a:endParaRPr>
-          </a:p>
-        </p:txBody>
-      </p:sp>
-    </p:spTree>
-    <p:extLst>
-      <p:ext uri="{BB962C8B-B14F-4D97-AF65-F5344CB8AC3E}">
-        <p14:creationId xmlns:p14="http://schemas.microsoft.com/office/powerpoint/2010/main" val="1619207882"/>
-      </p:ext>
-    </p:extLst>
-  </p:cSld>
-  <p:clrMapOvr>
-    <a:masterClrMapping/>
-  </p:clrMapOvr>
-</p:sld>
-</file>
-
-<file path=ppt/slides/slide11.xml><?xml version="1.0" encoding="utf-8"?>
-<p:sld xmlns:a="http://schemas.openxmlformats.org/drawingml/2006/main" xmlns:r="http://schemas.openxmlformats.org/officeDocument/2006/relationships" xmlns:p="http://schemas.openxmlformats.org/presentationml/2006/main">
-  <p:cSld>
-    <p:spTree>
-      <p:nvGrpSpPr>
-        <p:cNvPr id="1" name=""/>
-        <p:cNvGrpSpPr/>
-        <p:nvPr/>
-      </p:nvGrpSpPr>
-      <p:grpSpPr>
-        <a:xfrm>
-          <a:off x="0" y="0"/>
-          <a:ext cx="0" cy="0"/>
-          <a:chOff x="0" y="0"/>
-          <a:chExt cx="0" cy="0"/>
-        </a:xfrm>
-      </p:grpSpPr>
       <p:sp>
         <p:nvSpPr>
           <p:cNvPr id="24577" name="Title 1"/>
@@ -5960,7 +5434,7 @@
 </p:sld>
 </file>
 
-<file path=ppt/slides/slide12.xml><?xml version="1.0" encoding="utf-8"?>
+<file path=ppt/slides/slide11.xml><?xml version="1.0" encoding="utf-8"?>
 <p:sld xmlns:a="http://schemas.openxmlformats.org/drawingml/2006/main" xmlns:r="http://schemas.openxmlformats.org/officeDocument/2006/relationships" xmlns:p="http://schemas.openxmlformats.org/presentationml/2006/main">
   <p:cSld>
     <p:spTree>
@@ -6304,7 +5778,7 @@
 </p:sld>
 </file>
 
-<file path=ppt/slides/slide13.xml><?xml version="1.0" encoding="utf-8"?>
+<file path=ppt/slides/slide12.xml><?xml version="1.0" encoding="utf-8"?>
 <p:sld xmlns:a="http://schemas.openxmlformats.org/drawingml/2006/main" xmlns:r="http://schemas.openxmlformats.org/officeDocument/2006/relationships" xmlns:p="http://schemas.openxmlformats.org/presentationml/2006/main">
   <p:cSld>
     <p:spTree>
@@ -6396,7 +5870,7 @@
 </p:sld>
 </file>
 
-<file path=ppt/slides/slide14.xml><?xml version="1.0" encoding="utf-8"?>
+<file path=ppt/slides/slide13.xml><?xml version="1.0" encoding="utf-8"?>
 <p:sld xmlns:a="http://schemas.openxmlformats.org/drawingml/2006/main" xmlns:r="http://schemas.openxmlformats.org/officeDocument/2006/relationships" xmlns:p="http://schemas.openxmlformats.org/presentationml/2006/main">
   <p:cSld>
     <p:spTree>
@@ -7323,6 +6797,142 @@
 </p:sld>
 </file>
 
+<file path=ppt/slides/slide14.xml><?xml version="1.0" encoding="utf-8"?>
+<p:sld xmlns:a="http://schemas.openxmlformats.org/drawingml/2006/main" xmlns:r="http://schemas.openxmlformats.org/officeDocument/2006/relationships" xmlns:p="http://schemas.openxmlformats.org/presentationml/2006/main">
+  <p:cSld>
+    <p:spTree>
+      <p:nvGrpSpPr>
+        <p:cNvPr id="1" name=""/>
+        <p:cNvGrpSpPr/>
+        <p:nvPr/>
+      </p:nvGrpSpPr>
+      <p:grpSpPr>
+        <a:xfrm>
+          <a:off x="0" y="0"/>
+          <a:ext cx="0" cy="0"/>
+          <a:chOff x="0" y="0"/>
+          <a:chExt cx="0" cy="0"/>
+        </a:xfrm>
+      </p:grpSpPr>
+      <p:sp>
+        <p:nvSpPr>
+          <p:cNvPr id="2" name="Title 1"/>
+          <p:cNvSpPr>
+            <a:spLocks noGrp="1"/>
+          </p:cNvSpPr>
+          <p:nvPr>
+            <p:ph type="title"/>
+          </p:nvPr>
+        </p:nvSpPr>
+        <p:spPr/>
+        <p:txBody>
+          <a:bodyPr/>
+          <a:lstStyle/>
+          <a:p>
+            <a:r>
+              <a:rPr lang="en-US" dirty="0"/>
+              <a:t>Examples of scheduling algorithms (1/3)</a:t>
+            </a:r>
+          </a:p>
+        </p:txBody>
+      </p:sp>
+      <p:sp>
+        <p:nvSpPr>
+          <p:cNvPr id="3" name="Content Placeholder 2"/>
+          <p:cNvSpPr>
+            <a:spLocks noGrp="1"/>
+          </p:cNvSpPr>
+          <p:nvPr>
+            <p:ph idx="1"/>
+          </p:nvPr>
+        </p:nvSpPr>
+        <p:spPr>
+          <a:xfrm>
+            <a:off x="838200" y="1825624"/>
+            <a:ext cx="11078498" cy="4870143"/>
+          </a:xfrm>
+        </p:spPr>
+        <p:txBody>
+          <a:bodyPr>
+            <a:normAutofit/>
+          </a:bodyPr>
+          <a:lstStyle/>
+          <a:p>
+            <a:r>
+              <a:rPr lang="en-US" dirty="0"/>
+              <a:t>FIFO over packets</a:t>
+            </a:r>
+          </a:p>
+          <a:p>
+            <a:endParaRPr lang="en-US" dirty="0"/>
+          </a:p>
+          <a:p>
+            <a:r>
+              <a:rPr lang="en-US" dirty="0"/>
+              <a:t>Round-robin over packets of different flows</a:t>
+            </a:r>
+          </a:p>
+          <a:p>
+            <a:endParaRPr lang="en-US" dirty="0"/>
+          </a:p>
+          <a:p>
+            <a:r>
+              <a:rPr lang="en-US" dirty="0">
+                <a:solidFill>
+                  <a:srgbClr val="C00000"/>
+                </a:solidFill>
+              </a:rPr>
+              <a:t>Shortest Remaining Processing Time (SRPT)</a:t>
+            </a:r>
+          </a:p>
+          <a:p>
+            <a:pPr lvl="1"/>
+            <a:r>
+              <a:rPr lang="en-US" dirty="0"/>
+              <a:t>Flow-size-aware allocation which strictly prioritizes short flows</a:t>
+            </a:r>
+          </a:p>
+          <a:p>
+            <a:pPr lvl="1"/>
+            <a:r>
+              <a:rPr lang="en-US" dirty="0"/>
+              <a:t>Also called </a:t>
+            </a:r>
+            <a:r>
+              <a:rPr lang="en-US" dirty="0">
+                <a:solidFill>
+                  <a:srgbClr val="C00000"/>
+                </a:solidFill>
+              </a:rPr>
+              <a:t>shortest flow first</a:t>
+            </a:r>
+            <a:r>
+              <a:rPr lang="en-US" dirty="0"/>
+              <a:t> in some contexts</a:t>
+            </a:r>
+          </a:p>
+          <a:p>
+            <a:pPr lvl="1"/>
+            <a:r>
+              <a:rPr lang="en-US" dirty="0"/>
+              <a:t>Flow-size-unaware variant may predict demand using known flow size distribution</a:t>
+            </a:r>
+          </a:p>
+        </p:txBody>
+      </p:sp>
+    </p:spTree>
+    <p:extLst>
+      <p:ext uri="{BB962C8B-B14F-4D97-AF65-F5344CB8AC3E}">
+        <p14:creationId xmlns:p14="http://schemas.microsoft.com/office/powerpoint/2010/main" val="2864894231"/>
+      </p:ext>
+    </p:extLst>
+  </p:cSld>
+  <p:clrMapOvr>
+    <a:masterClrMapping/>
+  </p:clrMapOvr>
+</p:sld>
+</file>
+
 <file path=ppt/slides/slide15.xml><?xml version="1.0" encoding="utf-8"?>
 <p:sld xmlns:a="http://schemas.openxmlformats.org/drawingml/2006/main" xmlns:r="http://schemas.openxmlformats.org/officeDocument/2006/relationships" xmlns:p="http://schemas.openxmlformats.org/presentationml/2006/main">
   <p:cSld>
@@ -7357,142 +6967,6 @@
           <a:p>
             <a:r>
               <a:rPr lang="en-US" dirty="0"/>
-              <a:t>Examples of scheduling algorithms (1/3)</a:t>
-            </a:r>
-          </a:p>
-        </p:txBody>
-      </p:sp>
-      <p:sp>
-        <p:nvSpPr>
-          <p:cNvPr id="3" name="Content Placeholder 2"/>
-          <p:cNvSpPr>
-            <a:spLocks noGrp="1"/>
-          </p:cNvSpPr>
-          <p:nvPr>
-            <p:ph idx="1"/>
-          </p:nvPr>
-        </p:nvSpPr>
-        <p:spPr>
-          <a:xfrm>
-            <a:off x="838200" y="1825624"/>
-            <a:ext cx="11078498" cy="4870143"/>
-          </a:xfrm>
-        </p:spPr>
-        <p:txBody>
-          <a:bodyPr>
-            <a:normAutofit/>
-          </a:bodyPr>
-          <a:lstStyle/>
-          <a:p>
-            <a:r>
-              <a:rPr lang="en-US" dirty="0"/>
-              <a:t>FIFO over packets</a:t>
-            </a:r>
-          </a:p>
-          <a:p>
-            <a:endParaRPr lang="en-US" dirty="0"/>
-          </a:p>
-          <a:p>
-            <a:r>
-              <a:rPr lang="en-US" dirty="0"/>
-              <a:t>Round-robin over packets of different flows</a:t>
-            </a:r>
-          </a:p>
-          <a:p>
-            <a:endParaRPr lang="en-US" dirty="0"/>
-          </a:p>
-          <a:p>
-            <a:r>
-              <a:rPr lang="en-US" dirty="0">
-                <a:solidFill>
-                  <a:srgbClr val="C00000"/>
-                </a:solidFill>
-              </a:rPr>
-              <a:t>Shortest Remaining Processing Time (SRPT)</a:t>
-            </a:r>
-          </a:p>
-          <a:p>
-            <a:pPr lvl="1"/>
-            <a:r>
-              <a:rPr lang="en-US" dirty="0"/>
-              <a:t>Flow-size-aware allocation which strictly prioritizes short flows</a:t>
-            </a:r>
-          </a:p>
-          <a:p>
-            <a:pPr lvl="1"/>
-            <a:r>
-              <a:rPr lang="en-US" dirty="0"/>
-              <a:t>Also called </a:t>
-            </a:r>
-            <a:r>
-              <a:rPr lang="en-US" dirty="0">
-                <a:solidFill>
-                  <a:srgbClr val="C00000"/>
-                </a:solidFill>
-              </a:rPr>
-              <a:t>shortest flow first</a:t>
-            </a:r>
-            <a:r>
-              <a:rPr lang="en-US" dirty="0"/>
-              <a:t> in some contexts</a:t>
-            </a:r>
-          </a:p>
-          <a:p>
-            <a:pPr lvl="1"/>
-            <a:r>
-              <a:rPr lang="en-US" dirty="0"/>
-              <a:t>Flow-size-unaware variant may predict demand using known flow size distribution</a:t>
-            </a:r>
-          </a:p>
-        </p:txBody>
-      </p:sp>
-    </p:spTree>
-    <p:extLst>
-      <p:ext uri="{BB962C8B-B14F-4D97-AF65-F5344CB8AC3E}">
-        <p14:creationId xmlns:p14="http://schemas.microsoft.com/office/powerpoint/2010/main" val="2864894231"/>
-      </p:ext>
-    </p:extLst>
-  </p:cSld>
-  <p:clrMapOvr>
-    <a:masterClrMapping/>
-  </p:clrMapOvr>
-</p:sld>
-</file>
-
-<file path=ppt/slides/slide16.xml><?xml version="1.0" encoding="utf-8"?>
-<p:sld xmlns:a="http://schemas.openxmlformats.org/drawingml/2006/main" xmlns:r="http://schemas.openxmlformats.org/officeDocument/2006/relationships" xmlns:p="http://schemas.openxmlformats.org/presentationml/2006/main">
-  <p:cSld>
-    <p:spTree>
-      <p:nvGrpSpPr>
-        <p:cNvPr id="1" name=""/>
-        <p:cNvGrpSpPr/>
-        <p:nvPr/>
-      </p:nvGrpSpPr>
-      <p:grpSpPr>
-        <a:xfrm>
-          <a:off x="0" y="0"/>
-          <a:ext cx="0" cy="0"/>
-          <a:chOff x="0" y="0"/>
-          <a:chExt cx="0" cy="0"/>
-        </a:xfrm>
-      </p:grpSpPr>
-      <p:sp>
-        <p:nvSpPr>
-          <p:cNvPr id="2" name="Title 1"/>
-          <p:cNvSpPr>
-            <a:spLocks noGrp="1"/>
-          </p:cNvSpPr>
-          <p:nvPr>
-            <p:ph type="title"/>
-          </p:nvPr>
-        </p:nvSpPr>
-        <p:spPr/>
-        <p:txBody>
-          <a:bodyPr/>
-          <a:lstStyle/>
-          <a:p>
-            <a:r>
-              <a:rPr lang="en-US" dirty="0"/>
               <a:t>Examples of scheduling algorithms (2/3)</a:t>
             </a:r>
           </a:p>
@@ -7619,7 +7093,7 @@
 </p:sld>
 </file>
 
-<file path=ppt/slides/slide17.xml><?xml version="1.0" encoding="utf-8"?>
+<file path=ppt/slides/slide16.xml><?xml version="1.0" encoding="utf-8"?>
 <p:sld xmlns:a="http://schemas.openxmlformats.org/drawingml/2006/main" xmlns:r="http://schemas.openxmlformats.org/officeDocument/2006/relationships" xmlns:p="http://schemas.openxmlformats.org/presentationml/2006/main">
   <p:cSld>
     <p:spTree>
@@ -8345,7 +7819,7 @@
 </p:sld>
 </file>
 
-<file path=ppt/slides/slide18.xml><?xml version="1.0" encoding="utf-8"?>
+<file path=ppt/slides/slide17.xml><?xml version="1.0" encoding="utf-8"?>
 <p:sld xmlns:a="http://schemas.openxmlformats.org/drawingml/2006/main" xmlns:r="http://schemas.openxmlformats.org/officeDocument/2006/relationships" xmlns:p="http://schemas.openxmlformats.org/presentationml/2006/main">
   <p:cSld>
     <p:spTree>
@@ -8896,6 +8370,184 @@
 </p:sld>
 </file>
 
+<file path=ppt/slides/slide18.xml><?xml version="1.0" encoding="utf-8"?>
+<p:sld xmlns:a="http://schemas.openxmlformats.org/drawingml/2006/main" xmlns:r="http://schemas.openxmlformats.org/officeDocument/2006/relationships" xmlns:p="http://schemas.openxmlformats.org/presentationml/2006/main">
+  <p:cSld>
+    <p:spTree>
+      <p:nvGrpSpPr>
+        <p:cNvPr id="1" name=""/>
+        <p:cNvGrpSpPr/>
+        <p:nvPr/>
+      </p:nvGrpSpPr>
+      <p:grpSpPr>
+        <a:xfrm>
+          <a:off x="0" y="0"/>
+          <a:ext cx="0" cy="0"/>
+          <a:chOff x="0" y="0"/>
+          <a:chExt cx="0" cy="0"/>
+        </a:xfrm>
+      </p:grpSpPr>
+      <p:sp>
+        <p:nvSpPr>
+          <p:cNvPr id="2" name="Title 1"/>
+          <p:cNvSpPr>
+            <a:spLocks noGrp="1"/>
+          </p:cNvSpPr>
+          <p:nvPr>
+            <p:ph type="title"/>
+          </p:nvPr>
+        </p:nvSpPr>
+        <p:spPr/>
+        <p:txBody>
+          <a:bodyPr/>
+          <a:lstStyle/>
+          <a:p>
+            <a:r>
+              <a:rPr lang="en-US" dirty="0"/>
+              <a:t>Exercise: When does a flow finish?</a:t>
+            </a:r>
+          </a:p>
+        </p:txBody>
+      </p:sp>
+      <p:sp>
+        <p:nvSpPr>
+          <p:cNvPr id="3" name="Content Placeholder 2"/>
+          <p:cNvSpPr>
+            <a:spLocks noGrp="1"/>
+          </p:cNvSpPr>
+          <p:nvPr>
+            <p:ph idx="1"/>
+          </p:nvPr>
+        </p:nvSpPr>
+        <p:spPr>
+          <a:xfrm>
+            <a:off x="838200" y="1646444"/>
+            <a:ext cx="11196484" cy="5167312"/>
+          </a:xfrm>
+        </p:spPr>
+        <p:txBody>
+          <a:bodyPr>
+            <a:normAutofit/>
+          </a:bodyPr>
+          <a:lstStyle/>
+          <a:p>
+            <a:r>
+              <a:rPr lang="en-US" sz="3000" dirty="0"/>
+              <a:t>Consider a mix of “long” and “short” flows arriving at a Q</a:t>
+            </a:r>
+          </a:p>
+          <a:p>
+            <a:pPr lvl="1"/>
+            <a:r>
+              <a:rPr lang="en-US" dirty="0"/>
+              <a:t>Ex: A flow may have as few as 2 packets or as many as 10</a:t>
+            </a:r>
+            <a:r>
+              <a:rPr lang="en-US" baseline="30000" dirty="0"/>
+              <a:t>5</a:t>
+            </a:r>
+          </a:p>
+          <a:p>
+            <a:pPr lvl="1"/>
+            <a:endParaRPr lang="en-US" dirty="0"/>
+          </a:p>
+          <a:p>
+            <a:r>
+              <a:rPr lang="en-US" sz="3000" dirty="0"/>
+              <a:t>Suppose a scheduling algorithm provides each flow:</a:t>
+            </a:r>
+          </a:p>
+          <a:p>
+            <a:pPr lvl="1"/>
+            <a:r>
+              <a:rPr lang="en-US" dirty="0"/>
+              <a:t>An average </a:t>
+            </a:r>
+            <a:r>
+              <a:rPr lang="en-US" dirty="0">
+                <a:solidFill>
+                  <a:srgbClr val="C00000"/>
+                </a:solidFill>
+              </a:rPr>
+              <a:t>per-packet delay d</a:t>
+            </a:r>
+            <a:r>
+              <a:rPr lang="en-US" dirty="0"/>
+              <a:t> (e.g., 50 </a:t>
+            </a:r>
+            <a:r>
+              <a:rPr lang="en-US" dirty="0" err="1"/>
+              <a:t>ms</a:t>
+            </a:r>
+            <a:r>
+              <a:rPr lang="en-US" dirty="0"/>
+              <a:t>)</a:t>
+            </a:r>
+          </a:p>
+          <a:p>
+            <a:pPr lvl="1"/>
+            <a:r>
+              <a:rPr lang="en-US" dirty="0"/>
+              <a:t>An average </a:t>
+            </a:r>
+            <a:r>
+              <a:rPr lang="en-US" dirty="0">
+                <a:solidFill>
+                  <a:srgbClr val="C00000"/>
+                </a:solidFill>
+              </a:rPr>
+              <a:t>link bandwidth share t</a:t>
+            </a:r>
+            <a:r>
+              <a:rPr lang="en-US" dirty="0"/>
+              <a:t> (e.g., 10 Mbit/s)</a:t>
+            </a:r>
+          </a:p>
+          <a:p>
+            <a:pPr lvl="1"/>
+            <a:endParaRPr lang="en-US" dirty="0"/>
+          </a:p>
+          <a:p>
+            <a:r>
+              <a:rPr lang="en-US" sz="3000" dirty="0"/>
+              <a:t>Which among d &amp; t determines</a:t>
+            </a:r>
+          </a:p>
+          <a:p>
+            <a:pPr lvl="1"/>
+            <a:r>
+              <a:rPr lang="en-US" dirty="0"/>
+              <a:t>when a short flow finishes?</a:t>
+            </a:r>
+          </a:p>
+          <a:p>
+            <a:pPr lvl="1"/>
+            <a:r>
+              <a:rPr lang="en-US" dirty="0"/>
+              <a:t>when a long flow finishes?</a:t>
+            </a:r>
+          </a:p>
+          <a:p>
+            <a:pPr marL="457200" lvl="1" indent="0">
+              <a:buNone/>
+            </a:pPr>
+            <a:endParaRPr lang="en-US" dirty="0"/>
+          </a:p>
+        </p:txBody>
+      </p:sp>
+    </p:spTree>
+    <p:extLst>
+      <p:ext uri="{BB962C8B-B14F-4D97-AF65-F5344CB8AC3E}">
+        <p14:creationId xmlns:p14="http://schemas.microsoft.com/office/powerpoint/2010/main" val="2707557451"/>
+      </p:ext>
+    </p:extLst>
+  </p:cSld>
+  <p:clrMapOvr>
+    <a:masterClrMapping/>
+  </p:clrMapOvr>
+</p:sld>
+</file>
+
 <file path=ppt/slides/slide19.xml><?xml version="1.0" encoding="utf-8"?>
 <p:sld xmlns:a="http://schemas.openxmlformats.org/drawingml/2006/main" xmlns:r="http://schemas.openxmlformats.org/officeDocument/2006/relationships" xmlns:p="http://schemas.openxmlformats.org/presentationml/2006/main">
   <p:cSld>
@@ -8915,7 +8567,13 @@
       </p:grpSpPr>
       <p:sp>
         <p:nvSpPr>
-          <p:cNvPr id="2" name="Title 1"/>
+          <p:cNvPr id="2" name="Title 1">
+            <a:extLst>
+              <a:ext uri="{FF2B5EF4-FFF2-40B4-BE49-F238E27FC236}">
+                <a16:creationId xmlns:a16="http://schemas.microsoft.com/office/drawing/2014/main" id="{C24C7D3A-9D78-F44E-B9E4-1D8A5F8B8661}"/>
+              </a:ext>
+            </a:extLst>
+          </p:cNvPr>
           <p:cNvSpPr>
             <a:spLocks noGrp="1"/>
           </p:cNvSpPr>
@@ -8930,141 +8588,43 @@
           <a:p>
             <a:r>
               <a:rPr lang="en-US" dirty="0"/>
-              <a:t>Exercise: When does a flow finish?</a:t>
-            </a:r>
-          </a:p>
-        </p:txBody>
-      </p:sp>
-      <p:sp>
-        <p:nvSpPr>
-          <p:cNvPr id="3" name="Content Placeholder 2"/>
+              <a:t>Push In First Out (PIFO)</a:t>
+            </a:r>
+          </a:p>
+        </p:txBody>
+      </p:sp>
+      <p:sp>
+        <p:nvSpPr>
+          <p:cNvPr id="3" name="Text Placeholder 2">
+            <a:extLst>
+              <a:ext uri="{FF2B5EF4-FFF2-40B4-BE49-F238E27FC236}">
+                <a16:creationId xmlns:a16="http://schemas.microsoft.com/office/drawing/2014/main" id="{C381249E-4AF6-2941-9398-CD79A8898CFE}"/>
+              </a:ext>
+            </a:extLst>
+          </p:cNvPr>
           <p:cNvSpPr>
             <a:spLocks noGrp="1"/>
           </p:cNvSpPr>
           <p:nvPr>
-            <p:ph idx="1"/>
+            <p:ph type="body" idx="1"/>
           </p:nvPr>
         </p:nvSpPr>
-        <p:spPr>
-          <a:xfrm>
-            <a:off x="838200" y="1646444"/>
-            <a:ext cx="11196484" cy="5167312"/>
-          </a:xfrm>
-        </p:spPr>
-        <p:txBody>
-          <a:bodyPr>
-            <a:normAutofit/>
-          </a:bodyPr>
+        <p:spPr/>
+        <p:txBody>
+          <a:bodyPr/>
           <a:lstStyle/>
           <a:p>
             <a:r>
-              <a:rPr lang="en-US" sz="3000" dirty="0"/>
-              <a:t>Consider a mix of “long” and “short” flows arriving at a Q</a:t>
-            </a:r>
-          </a:p>
-          <a:p>
-            <a:pPr lvl="1"/>
-            <a:r>
               <a:rPr lang="en-US" dirty="0"/>
-              <a:t>Ex: A flow may have as few as 2 packets or as many as 10</a:t>
-            </a:r>
-            <a:r>
-              <a:rPr lang="en-US" baseline="30000" dirty="0"/>
-              <a:t>5</a:t>
-            </a:r>
-          </a:p>
-          <a:p>
-            <a:pPr lvl="1"/>
-            <a:endParaRPr lang="en-US" dirty="0"/>
-          </a:p>
-          <a:p>
-            <a:r>
-              <a:rPr lang="en-US" sz="3000" dirty="0"/>
-              <a:t>Suppose a scheduling algorithm provides each flow:</a:t>
-            </a:r>
-          </a:p>
-          <a:p>
-            <a:pPr lvl="1"/>
-            <a:r>
-              <a:rPr lang="en-US" dirty="0"/>
-              <a:t>An average </a:t>
-            </a:r>
-            <a:r>
-              <a:rPr lang="en-US" dirty="0">
-                <a:solidFill>
-                  <a:srgbClr val="C00000"/>
-                </a:solidFill>
-              </a:rPr>
-              <a:t>per-packet delay d</a:t>
-            </a:r>
-            <a:r>
-              <a:rPr lang="en-US" dirty="0"/>
-              <a:t> (e.g., 50 </a:t>
-            </a:r>
-            <a:r>
-              <a:rPr lang="en-US" dirty="0" err="1"/>
-              <a:t>ms</a:t>
-            </a:r>
-            <a:r>
-              <a:rPr lang="en-US" dirty="0"/>
-              <a:t>)</a:t>
-            </a:r>
-          </a:p>
-          <a:p>
-            <a:pPr lvl="1"/>
-            <a:r>
-              <a:rPr lang="en-US" dirty="0"/>
-              <a:t>An average </a:t>
-            </a:r>
-            <a:r>
-              <a:rPr lang="en-US" dirty="0">
-                <a:solidFill>
-                  <a:srgbClr val="C00000"/>
-                </a:solidFill>
-              </a:rPr>
-              <a:t>link bandwidth share t</a:t>
-            </a:r>
-            <a:r>
-              <a:rPr lang="en-US" dirty="0"/>
-              <a:t> (e.g., 10 Mbit/s)</a:t>
-            </a:r>
-          </a:p>
-          <a:p>
-            <a:pPr lvl="1"/>
-            <a:endParaRPr lang="en-US" dirty="0"/>
-          </a:p>
-          <a:p>
-            <a:r>
-              <a:rPr lang="en-US" sz="3000" dirty="0"/>
-              <a:t>Which among d &amp; t determines</a:t>
-            </a:r>
-          </a:p>
-          <a:p>
-            <a:pPr lvl="1"/>
-            <a:r>
-              <a:rPr lang="en-US" dirty="0"/>
-              <a:t>when a short flow finishes?</a:t>
-            </a:r>
-          </a:p>
-          <a:p>
-            <a:pPr lvl="1"/>
-            <a:r>
-              <a:rPr lang="en-US" dirty="0"/>
-              <a:t>when a long flow finishes?</a:t>
-            </a:r>
-          </a:p>
-          <a:p>
-            <a:pPr marL="457200" lvl="1" indent="0">
-              <a:buNone/>
-            </a:pPr>
-            <a:endParaRPr lang="en-US" dirty="0"/>
+              <a:t>A common primitive for many scheduling algorithms</a:t>
+            </a:r>
           </a:p>
         </p:txBody>
       </p:sp>
     </p:spTree>
     <p:extLst>
       <p:ext uri="{BB962C8B-B14F-4D97-AF65-F5344CB8AC3E}">
-        <p14:creationId xmlns:p14="http://schemas.microsoft.com/office/powerpoint/2010/main" val="2707557451"/>
+        <p14:creationId xmlns:p14="http://schemas.microsoft.com/office/powerpoint/2010/main" val="2421816092"/>
       </p:ext>
     </p:extLst>
   </p:cSld>
@@ -9093,13 +8653,7 @@
       </p:grpSpPr>
       <p:sp>
         <p:nvSpPr>
-          <p:cNvPr id="2" name="Title 1">
-            <a:extLst>
-              <a:ext uri="{FF2B5EF4-FFF2-40B4-BE49-F238E27FC236}">
-                <a16:creationId xmlns:a16="http://schemas.microsoft.com/office/drawing/2014/main" id="{657C8F89-52A1-8A4D-BA14-6F372F11E2AF}"/>
-              </a:ext>
-            </a:extLst>
-          </p:cNvPr>
+          <p:cNvPr id="2" name="Title 1"/>
           <p:cNvSpPr>
             <a:spLocks noGrp="1"/>
           </p:cNvSpPr>
@@ -9114,20 +8668,14 @@
           <a:p>
             <a:r>
               <a:rPr lang="en-US" dirty="0"/>
-              <a:t>Outline</a:t>
-            </a:r>
-          </a:p>
-        </p:txBody>
-      </p:sp>
-      <p:sp>
-        <p:nvSpPr>
-          <p:cNvPr id="3" name="Content Placeholder 2">
-            <a:extLst>
-              <a:ext uri="{FF2B5EF4-FFF2-40B4-BE49-F238E27FC236}">
-                <a16:creationId xmlns:a16="http://schemas.microsoft.com/office/drawing/2014/main" id="{0A8D0639-1058-DC4A-BE11-98457556B175}"/>
-              </a:ext>
-            </a:extLst>
-          </p:cNvPr>
+              <a:t>Scheduling in switch pipelines</a:t>
+            </a:r>
+          </a:p>
+        </p:txBody>
+      </p:sp>
+      <p:sp>
+        <p:nvSpPr>
+          <p:cNvPr id="3" name="Content Placeholder 2"/>
           <p:cNvSpPr>
             <a:spLocks noGrp="1"/>
           </p:cNvSpPr>
@@ -9135,60 +8683,180 @@
             <p:ph idx="1"/>
           </p:nvPr>
         </p:nvSpPr>
-        <p:spPr/>
+        <p:spPr>
+          <a:xfrm>
+            <a:off x="838200" y="1690688"/>
+            <a:ext cx="10879183" cy="4351338"/>
+          </a:xfrm>
+        </p:spPr>
         <p:txBody>
           <a:bodyPr/>
           <a:lstStyle/>
           <a:p>
             <a:r>
               <a:rPr lang="en-US" dirty="0"/>
-              <a:t>What is scheduling? Broader context? Why should you as a student care? Broader implications (net neutrality, QoS, …)</a:t>
+              <a:t>Packets wait in buffers/queues until serviced</a:t>
             </a:r>
           </a:p>
           <a:p>
             <a:r>
               <a:rPr lang="en-US" dirty="0"/>
-              <a:t>Different kinds of scheduling requirements &amp; how implemented. Strict priorities, fair queueing, rate limiting, hierarchies</a:t>
-            </a:r>
-          </a:p>
-          <a:p>
+              <a:t>Two possibilities: </a:t>
+            </a:r>
+            <a:r>
+              <a:rPr lang="en-US" dirty="0">
+                <a:solidFill>
+                  <a:srgbClr val="C00000"/>
+                </a:solidFill>
+              </a:rPr>
+              <a:t>Input-queued</a:t>
+            </a:r>
             <a:r>
               <a:rPr lang="en-US" dirty="0"/>
-              <a:t>Where can scheduling be implemented? Reminder of PISA/RMT architecture</a:t>
+              <a:t> vs. </a:t>
+            </a:r>
+            <a:r>
+              <a:rPr lang="en-US" dirty="0">
+                <a:solidFill>
+                  <a:srgbClr val="C00000"/>
+                </a:solidFill>
+              </a:rPr>
+              <a:t>output-queued</a:t>
             </a:r>
           </a:p>
           <a:p>
             <a:r>
               <a:rPr lang="en-US" dirty="0"/>
-              <a:t>Useful scheduling policies. </a:t>
-            </a:r>
-          </a:p>
-          <a:p>
+              <a:t>Suppose there are pkts on port 1 to both 2 and 3</a:t>
+            </a:r>
+          </a:p>
+          <a:p>
+            <a:pPr lvl="1"/>
             <a:r>
               <a:rPr lang="en-US" dirty="0"/>
-              <a:t>Linux </a:t>
-            </a:r>
-            <a:r>
-              <a:rPr lang="en-US" dirty="0" err="1"/>
-              <a:t>qdiscs</a:t>
-            </a:r>
+              <a:t>But suppose port 2 is clogged</a:t>
+            </a:r>
+          </a:p>
+          <a:p>
+            <a:pPr lvl="1"/>
             <a:r>
               <a:rPr lang="en-US" dirty="0"/>
-              <a:t> (enqueue, dequeue policies)</a:t>
-            </a:r>
-          </a:p>
-          <a:p>
+              <a:t>Port 1’s packets towards port 3 should not be delayed (</a:t>
+            </a:r>
+            <a:r>
+              <a:rPr lang="en-US" dirty="0">
+                <a:solidFill>
+                  <a:srgbClr val="C00000"/>
+                </a:solidFill>
+              </a:rPr>
+              <a:t>HOL block</a:t>
+            </a:r>
             <a:r>
               <a:rPr lang="en-US" dirty="0"/>
-              <a:t>How fair queueing is typically implemented today (DRR)</a:t>
-            </a:r>
+              <a:t>)</a:t>
+            </a:r>
+          </a:p>
+          <a:p>
+            <a:r>
+              <a:rPr lang="en-US" dirty="0"/>
+              <a:t>Better to have queues represent output port contention</a:t>
+            </a:r>
+          </a:p>
+        </p:txBody>
+      </p:sp>
+      <p:pic>
+        <p:nvPicPr>
+          <p:cNvPr id="4" name="Picture 3"/>
+          <p:cNvPicPr>
+            <a:picLocks noChangeAspect="1"/>
+          </p:cNvPicPr>
+          <p:nvPr/>
+        </p:nvPicPr>
+        <p:blipFill>
+          <a:blip r:embed="rId2">
+            <a:extLst>
+              <a:ext uri="{28A0092B-C50C-407E-A947-70E740481C1C}">
+                <a14:useLocalDpi xmlns:a14="http://schemas.microsoft.com/office/drawing/2010/main" val="0"/>
+              </a:ext>
+            </a:extLst>
+          </a:blip>
+          <a:stretch>
+            <a:fillRect/>
+          </a:stretch>
+        </p:blipFill>
+        <p:spPr>
+          <a:xfrm>
+            <a:off x="170481" y="4565641"/>
+            <a:ext cx="11933694" cy="2146059"/>
+          </a:xfrm>
+          <a:prstGeom prst="rect">
+            <a:avLst/>
+          </a:prstGeom>
+        </p:spPr>
+      </p:pic>
+      <p:sp>
+        <p:nvSpPr>
+          <p:cNvPr id="5" name="Oval 4">
+            <a:extLst>
+              <a:ext uri="{FF2B5EF4-FFF2-40B4-BE49-F238E27FC236}">
+                <a16:creationId xmlns:a16="http://schemas.microsoft.com/office/drawing/2014/main" id="{7818E87D-F880-9247-BAF6-1BB3CE993A11}"/>
+              </a:ext>
+            </a:extLst>
+          </p:cNvPr>
+          <p:cNvSpPr/>
+          <p:nvPr/>
+        </p:nvSpPr>
+        <p:spPr>
+          <a:xfrm>
+            <a:off x="4881154" y="4565640"/>
+            <a:ext cx="2429691" cy="2146060"/>
+          </a:xfrm>
+          <a:prstGeom prst="ellipse">
+            <a:avLst/>
+          </a:prstGeom>
+          <a:noFill/>
+          <a:ln w="63500">
+            <a:solidFill>
+              <a:srgbClr val="C00000"/>
+            </a:solidFill>
+            <a:prstDash val="solid"/>
+            <a:tailEnd type="triangle" w="lg" len="lg"/>
+          </a:ln>
+        </p:spPr>
+        <p:style>
+          <a:lnRef idx="2">
+            <a:schemeClr val="accent1">
+              <a:shade val="50000"/>
+            </a:schemeClr>
+          </a:lnRef>
+          <a:fillRef idx="1">
+            <a:schemeClr val="accent1"/>
+          </a:fillRef>
+          <a:effectRef idx="0">
+            <a:schemeClr val="accent1"/>
+          </a:effectRef>
+          <a:fontRef idx="minor">
+            <a:schemeClr val="lt1"/>
+          </a:fontRef>
+        </p:style>
+        <p:txBody>
+          <a:bodyPr rtlCol="0" anchor="ctr"/>
+          <a:lstStyle/>
+          <a:p>
+            <a:pPr algn="ctr"/>
+            <a:endParaRPr lang="en-US" sz="2800" dirty="0">
+              <a:solidFill>
+                <a:schemeClr val="tx1"/>
+              </a:solidFill>
+              <a:latin typeface="Helvetica" pitchFamily="2" charset="0"/>
+            </a:endParaRPr>
           </a:p>
         </p:txBody>
       </p:sp>
     </p:spTree>
     <p:extLst>
       <p:ext uri="{BB962C8B-B14F-4D97-AF65-F5344CB8AC3E}">
-        <p14:creationId xmlns:p14="http://schemas.microsoft.com/office/powerpoint/2010/main" val="832552171"/>
+        <p14:creationId xmlns:p14="http://schemas.microsoft.com/office/powerpoint/2010/main" val="31011709"/>
       </p:ext>
     </p:extLst>
   </p:cSld>
@@ -9199,92 +8867,6 @@
 </file>
 
 <file path=ppt/slides/slide20.xml><?xml version="1.0" encoding="utf-8"?>
-<p:sld xmlns:a="http://schemas.openxmlformats.org/drawingml/2006/main" xmlns:r="http://schemas.openxmlformats.org/officeDocument/2006/relationships" xmlns:p="http://schemas.openxmlformats.org/presentationml/2006/main">
-  <p:cSld>
-    <p:spTree>
-      <p:nvGrpSpPr>
-        <p:cNvPr id="1" name=""/>
-        <p:cNvGrpSpPr/>
-        <p:nvPr/>
-      </p:nvGrpSpPr>
-      <p:grpSpPr>
-        <a:xfrm>
-          <a:off x="0" y="0"/>
-          <a:ext cx="0" cy="0"/>
-          <a:chOff x="0" y="0"/>
-          <a:chExt cx="0" cy="0"/>
-        </a:xfrm>
-      </p:grpSpPr>
-      <p:sp>
-        <p:nvSpPr>
-          <p:cNvPr id="2" name="Title 1">
-            <a:extLst>
-              <a:ext uri="{FF2B5EF4-FFF2-40B4-BE49-F238E27FC236}">
-                <a16:creationId xmlns:a16="http://schemas.microsoft.com/office/drawing/2014/main" id="{C24C7D3A-9D78-F44E-B9E4-1D8A5F8B8661}"/>
-              </a:ext>
-            </a:extLst>
-          </p:cNvPr>
-          <p:cNvSpPr>
-            <a:spLocks noGrp="1"/>
-          </p:cNvSpPr>
-          <p:nvPr>
-            <p:ph type="title"/>
-          </p:nvPr>
-        </p:nvSpPr>
-        <p:spPr/>
-        <p:txBody>
-          <a:bodyPr/>
-          <a:lstStyle/>
-          <a:p>
-            <a:r>
-              <a:rPr lang="en-US" dirty="0"/>
-              <a:t>Push In First Out (PIFO)</a:t>
-            </a:r>
-          </a:p>
-        </p:txBody>
-      </p:sp>
-      <p:sp>
-        <p:nvSpPr>
-          <p:cNvPr id="3" name="Text Placeholder 2">
-            <a:extLst>
-              <a:ext uri="{FF2B5EF4-FFF2-40B4-BE49-F238E27FC236}">
-                <a16:creationId xmlns:a16="http://schemas.microsoft.com/office/drawing/2014/main" id="{C381249E-4AF6-2941-9398-CD79A8898CFE}"/>
-              </a:ext>
-            </a:extLst>
-          </p:cNvPr>
-          <p:cNvSpPr>
-            <a:spLocks noGrp="1"/>
-          </p:cNvSpPr>
-          <p:nvPr>
-            <p:ph type="body" idx="1"/>
-          </p:nvPr>
-        </p:nvSpPr>
-        <p:spPr/>
-        <p:txBody>
-          <a:bodyPr/>
-          <a:lstStyle/>
-          <a:p>
-            <a:r>
-              <a:rPr lang="en-US" dirty="0"/>
-              <a:t>A common primitive for many scheduling algorithms</a:t>
-            </a:r>
-          </a:p>
-        </p:txBody>
-      </p:sp>
-    </p:spTree>
-    <p:extLst>
-      <p:ext uri="{BB962C8B-B14F-4D97-AF65-F5344CB8AC3E}">
-        <p14:creationId xmlns:p14="http://schemas.microsoft.com/office/powerpoint/2010/main" val="2421816092"/>
-      </p:ext>
-    </p:extLst>
-  </p:cSld>
-  <p:clrMapOvr>
-    <a:masterClrMapping/>
-  </p:clrMapOvr>
-</p:sld>
-</file>
-
-<file path=ppt/slides/slide21.xml><?xml version="1.0" encoding="utf-8"?>
 <p:sld xmlns:a="http://schemas.openxmlformats.org/drawingml/2006/main" xmlns:r="http://schemas.openxmlformats.org/officeDocument/2006/relationships" xmlns:p="http://schemas.openxmlformats.org/presentationml/2006/main">
   <p:cSld>
     <p:spTree>
@@ -9525,7 +9107,7 @@
 </p:sld>
 </file>
 
-<file path=ppt/slides/slide22.xml><?xml version="1.0" encoding="utf-8"?>
+<file path=ppt/slides/slide21.xml><?xml version="1.0" encoding="utf-8"?>
 <p:sld xmlns:a="http://schemas.openxmlformats.org/drawingml/2006/main" xmlns:r="http://schemas.openxmlformats.org/officeDocument/2006/relationships" xmlns:p="http://schemas.openxmlformats.org/presentationml/2006/main">
   <p:cSld>
     <p:spTree>
@@ -9649,7 +9231,7 @@
 </p:sld>
 </file>
 
-<file path=ppt/slides/slide23.xml><?xml version="1.0" encoding="utf-8"?>
+<file path=ppt/slides/slide22.xml><?xml version="1.0" encoding="utf-8"?>
 <p:sld xmlns:a="http://schemas.openxmlformats.org/drawingml/2006/main" xmlns:r="http://schemas.openxmlformats.org/officeDocument/2006/relationships" xmlns:p="http://schemas.openxmlformats.org/presentationml/2006/main">
   <p:cSld>
     <p:spTree>
@@ -9762,7 +9344,7 @@
 </p:sld>
 </file>
 
-<file path=ppt/slides/slide24.xml><?xml version="1.0" encoding="utf-8"?>
+<file path=ppt/slides/slide23.xml><?xml version="1.0" encoding="utf-8"?>
 <p:sld xmlns:a="http://schemas.openxmlformats.org/drawingml/2006/main" xmlns:r="http://schemas.openxmlformats.org/officeDocument/2006/relationships" xmlns:p="http://schemas.openxmlformats.org/presentationml/2006/main">
   <p:cSld>
     <p:spTree>
@@ -11099,7 +10681,7 @@
 </p:sld>
 </file>
 
-<file path=ppt/slides/slide25.xml><?xml version="1.0" encoding="utf-8"?>
+<file path=ppt/slides/slide24.xml><?xml version="1.0" encoding="utf-8"?>
 <p:sld xmlns:a="http://schemas.openxmlformats.org/drawingml/2006/main" xmlns:r="http://schemas.openxmlformats.org/officeDocument/2006/relationships" xmlns:p="http://schemas.openxmlformats.org/presentationml/2006/main">
   <p:cSld>
     <p:spTree>
@@ -11248,7 +10830,7 @@
 </p:sld>
 </file>
 
-<file path=ppt/slides/slide26.xml><?xml version="1.0" encoding="utf-8"?>
+<file path=ppt/slides/slide25.xml><?xml version="1.0" encoding="utf-8"?>
 <p:sld xmlns:a="http://schemas.openxmlformats.org/drawingml/2006/main" xmlns:r="http://schemas.openxmlformats.org/officeDocument/2006/relationships" xmlns:p="http://schemas.openxmlformats.org/presentationml/2006/main">
   <p:cSld>
     <p:spTree>
@@ -11427,7 +11009,7 @@
 </p:sld>
 </file>
 
-<file path=ppt/slides/slide27.xml><?xml version="1.0" encoding="utf-8"?>
+<file path=ppt/slides/slide26.xml><?xml version="1.0" encoding="utf-8"?>
 <p:sld xmlns:a="http://schemas.openxmlformats.org/drawingml/2006/main" xmlns:r="http://schemas.openxmlformats.org/officeDocument/2006/relationships" xmlns:p="http://schemas.openxmlformats.org/presentationml/2006/main">
   <p:cSld>
     <p:spTree>
@@ -11577,7 +11159,7 @@
 </p:sld>
 </file>
 
-<file path=ppt/slides/slide28.xml><?xml version="1.0" encoding="utf-8"?>
+<file path=ppt/slides/slide27.xml><?xml version="1.0" encoding="utf-8"?>
 <p:sld xmlns:a="http://schemas.openxmlformats.org/drawingml/2006/main" xmlns:r="http://schemas.openxmlformats.org/officeDocument/2006/relationships" xmlns:p="http://schemas.openxmlformats.org/presentationml/2006/main">
   <p:cSld>
     <p:spTree>
@@ -11690,7 +11272,7 @@
 </p:sld>
 </file>
 
-<file path=ppt/slides/slide29.xml><?xml version="1.0" encoding="utf-8"?>
+<file path=ppt/slides/slide28.xml><?xml version="1.0" encoding="utf-8"?>
 <p:sld xmlns:a="http://schemas.openxmlformats.org/drawingml/2006/main" xmlns:r="http://schemas.openxmlformats.org/officeDocument/2006/relationships" xmlns:p="http://schemas.openxmlformats.org/presentationml/2006/main">
   <p:cSld>
     <p:spTree>
@@ -11803,6 +11385,86 @@
 </p:sld>
 </file>
 
+<file path=ppt/slides/slide29.xml><?xml version="1.0" encoding="utf-8"?>
+<p:sld xmlns:a="http://schemas.openxmlformats.org/drawingml/2006/main" xmlns:r="http://schemas.openxmlformats.org/officeDocument/2006/relationships" xmlns:p="http://schemas.openxmlformats.org/presentationml/2006/main">
+  <p:cSld>
+    <p:spTree>
+      <p:nvGrpSpPr>
+        <p:cNvPr id="1" name=""/>
+        <p:cNvGrpSpPr/>
+        <p:nvPr/>
+      </p:nvGrpSpPr>
+      <p:grpSpPr>
+        <a:xfrm>
+          <a:off x="0" y="0"/>
+          <a:ext cx="0" cy="0"/>
+          <a:chOff x="0" y="0"/>
+          <a:chExt cx="0" cy="0"/>
+        </a:xfrm>
+      </p:grpSpPr>
+      <p:sp>
+        <p:nvSpPr>
+          <p:cNvPr id="2" name="Title 1">
+            <a:extLst>
+              <a:ext uri="{FF2B5EF4-FFF2-40B4-BE49-F238E27FC236}">
+                <a16:creationId xmlns:a16="http://schemas.microsoft.com/office/drawing/2014/main" id="{AA2C48F8-5C09-FE40-BDAF-8AF11BEF9149}"/>
+              </a:ext>
+            </a:extLst>
+          </p:cNvPr>
+          <p:cNvSpPr>
+            <a:spLocks noGrp="1"/>
+          </p:cNvSpPr>
+          <p:nvPr>
+            <p:ph type="title"/>
+          </p:nvPr>
+        </p:nvSpPr>
+        <p:spPr/>
+        <p:txBody>
+          <a:bodyPr/>
+          <a:lstStyle/>
+          <a:p>
+            <a:endParaRPr lang="en-US"/>
+          </a:p>
+        </p:txBody>
+      </p:sp>
+      <p:sp>
+        <p:nvSpPr>
+          <p:cNvPr id="3" name="Content Placeholder 2">
+            <a:extLst>
+              <a:ext uri="{FF2B5EF4-FFF2-40B4-BE49-F238E27FC236}">
+                <a16:creationId xmlns:a16="http://schemas.microsoft.com/office/drawing/2014/main" id="{5BA2EF6D-2B57-2344-8AA1-7634C38F1B08}"/>
+              </a:ext>
+            </a:extLst>
+          </p:cNvPr>
+          <p:cNvSpPr>
+            <a:spLocks noGrp="1"/>
+          </p:cNvSpPr>
+          <p:nvPr>
+            <p:ph idx="1"/>
+          </p:nvPr>
+        </p:nvSpPr>
+        <p:spPr/>
+        <p:txBody>
+          <a:bodyPr/>
+          <a:lstStyle/>
+          <a:p>
+            <a:endParaRPr lang="en-US"/>
+          </a:p>
+        </p:txBody>
+      </p:sp>
+    </p:spTree>
+    <p:extLst>
+      <p:ext uri="{BB962C8B-B14F-4D97-AF65-F5344CB8AC3E}">
+        <p14:creationId xmlns:p14="http://schemas.microsoft.com/office/powerpoint/2010/main" val="716140489"/>
+      </p:ext>
+    </p:extLst>
+  </p:cSld>
+  <p:clrMapOvr>
+    <a:masterClrMapping/>
+  </p:clrMapOvr>
+</p:sld>
+</file>
+
 <file path=ppt/slides/slide3.xml><?xml version="1.0" encoding="utf-8"?>
 <p:sld xmlns:a="http://schemas.openxmlformats.org/drawingml/2006/main" xmlns:r="http://schemas.openxmlformats.org/officeDocument/2006/relationships" xmlns:p="http://schemas.openxmlformats.org/presentationml/2006/main">
   <p:cSld>
@@ -11822,7 +11484,13 @@
       </p:grpSpPr>
       <p:sp>
         <p:nvSpPr>
-          <p:cNvPr id="2" name="Title 1"/>
+          <p:cNvPr id="2" name="Title 1">
+            <a:extLst>
+              <a:ext uri="{FF2B5EF4-FFF2-40B4-BE49-F238E27FC236}">
+                <a16:creationId xmlns:a16="http://schemas.microsoft.com/office/drawing/2014/main" id="{B034177D-142D-9A4A-83C1-F5C306969C1E}"/>
+              </a:ext>
+            </a:extLst>
+          </p:cNvPr>
           <p:cNvSpPr>
             <a:spLocks noGrp="1"/>
           </p:cNvSpPr>
@@ -11837,14 +11505,20 @@
           <a:p>
             <a:r>
               <a:rPr lang="en-US" dirty="0"/>
-              <a:t>Scheduling in switch pipelines</a:t>
-            </a:r>
-          </a:p>
-        </p:txBody>
-      </p:sp>
-      <p:sp>
-        <p:nvSpPr>
-          <p:cNvPr id="3" name="Content Placeholder 2"/>
+              <a:t>Why care about packet scheduling?</a:t>
+            </a:r>
+          </a:p>
+        </p:txBody>
+      </p:sp>
+      <p:sp>
+        <p:nvSpPr>
+          <p:cNvPr id="3" name="Content Placeholder 2">
+            <a:extLst>
+              <a:ext uri="{FF2B5EF4-FFF2-40B4-BE49-F238E27FC236}">
+                <a16:creationId xmlns:a16="http://schemas.microsoft.com/office/drawing/2014/main" id="{F13E5DD5-8446-1A40-8C04-9FB9202610A8}"/>
+              </a:ext>
+            </a:extLst>
+          </p:cNvPr>
           <p:cNvSpPr>
             <a:spLocks noGrp="1"/>
           </p:cNvSpPr>
@@ -11854,23 +11528,26 @@
         </p:nvSpPr>
         <p:spPr>
           <a:xfrm>
-            <a:off x="838200" y="1690688"/>
-            <a:ext cx="10879183" cy="4351338"/>
+            <a:off x="838200" y="1825624"/>
+            <a:ext cx="10515600" cy="5032375"/>
           </a:xfrm>
         </p:spPr>
         <p:txBody>
-          <a:bodyPr/>
+          <a:bodyPr>
+            <a:normAutofit/>
+          </a:bodyPr>
           <a:lstStyle/>
           <a:p>
             <a:r>
               <a:rPr lang="en-US" dirty="0"/>
-              <a:t>Packets wait in buffers/queues until serviced</a:t>
-            </a:r>
-          </a:p>
-          <a:p>
+              <a:t>Significantly influences how packets are treated regardless of the endpoint transport</a:t>
+            </a:r>
+          </a:p>
+          <a:p>
+            <a:pPr lvl="1"/>
             <a:r>
               <a:rPr lang="en-US" dirty="0"/>
-              <a:t>Two possibilities: </a:t>
+              <a:t>Implementations of </a:t>
             </a:r>
             <a:r>
               <a:rPr lang="en-US" dirty="0">
@@ -11878,11 +11555,18 @@
                   <a:srgbClr val="C00000"/>
                 </a:solidFill>
               </a:rPr>
-              <a:t>Input-queued</a:t>
+              <a:t>Quality of Service (QoS)</a:t>
             </a:r>
             <a:r>
               <a:rPr lang="en-US" dirty="0"/>
-              <a:t> vs. </a:t>
+              <a:t> within large networks</a:t>
+            </a:r>
+          </a:p>
+          <a:p>
+            <a:pPr lvl="1"/>
+            <a:r>
+              <a:rPr lang="en-US" dirty="0"/>
+              <a:t>Implications for </a:t>
             </a:r>
             <a:r>
               <a:rPr lang="en-US" dirty="0">
@@ -11890,27 +11574,27 @@
                   <a:srgbClr val="C00000"/>
                 </a:solidFill>
               </a:rPr>
-              <a:t>output-queued</a:t>
-            </a:r>
-          </a:p>
-          <a:p>
+              <a:t>net neutrality </a:t>
+            </a:r>
             <a:r>
               <a:rPr lang="en-US" dirty="0"/>
-              <a:t>Suppose there are pkts on port 1 to both 2 and 3</a:t>
+              <a:t>debates</a:t>
+            </a:r>
+          </a:p>
+          <a:p>
+            <a:endParaRPr lang="en-US" dirty="0"/>
+          </a:p>
+          <a:p>
+            <a:r>
+              <a:rPr lang="en-US" dirty="0"/>
+              <a:t>Intellectually interesting and influential (“top 10”) question</a:t>
             </a:r>
           </a:p>
           <a:p>
             <a:pPr lvl="1"/>
             <a:r>
               <a:rPr lang="en-US" dirty="0"/>
-              <a:t>But suppose port 2 is clogged</a:t>
-            </a:r>
-          </a:p>
-          <a:p>
-            <a:pPr lvl="1"/>
-            <a:r>
-              <a:rPr lang="en-US" dirty="0"/>
-              <a:t>Port 1’s packets towards port 3 should not be delayed (</a:t>
+              <a:t>Classic Demers et al paper (WFQ) has </a:t>
             </a:r>
             <a:r>
               <a:rPr lang="en-US" dirty="0">
@@ -11918,114 +11602,45 @@
                   <a:srgbClr val="C00000"/>
                 </a:solidFill>
               </a:rPr>
-              <a:t>HOL block</a:t>
+              <a:t>~ 1500 </a:t>
             </a:r>
             <a:r>
               <a:rPr lang="en-US" dirty="0"/>
-              <a:t>)</a:t>
-            </a:r>
-          </a:p>
-          <a:p>
+              <a:t>citations</a:t>
+            </a:r>
+          </a:p>
+          <a:p>
+            <a:pPr lvl="1"/>
             <a:r>
               <a:rPr lang="en-US" dirty="0"/>
-              <a:t>Better to have queues represent output port contention</a:t>
-            </a:r>
-          </a:p>
-        </p:txBody>
-      </p:sp>
-      <p:pic>
-        <p:nvPicPr>
-          <p:cNvPr id="4" name="Picture 3"/>
-          <p:cNvPicPr>
-            <a:picLocks noChangeAspect="1"/>
-          </p:cNvPicPr>
-          <p:nvPr/>
-        </p:nvPicPr>
-        <p:blipFill>
-          <a:blip r:embed="rId2">
-            <a:extLst>
-              <a:ext uri="{28A0092B-C50C-407E-A947-70E740481C1C}">
-                <a14:useLocalDpi xmlns:a14="http://schemas.microsoft.com/office/drawing/2010/main" val="0"/>
-              </a:ext>
-            </a:extLst>
-          </a:blip>
-          <a:stretch>
-            <a:fillRect/>
-          </a:stretch>
-        </p:blipFill>
-        <p:spPr>
-          <a:xfrm>
-            <a:off x="170481" y="4565641"/>
-            <a:ext cx="11933694" cy="2146059"/>
-          </a:xfrm>
-          <a:prstGeom prst="rect">
-            <a:avLst/>
-          </a:prstGeom>
-        </p:spPr>
-      </p:pic>
-      <p:sp>
-        <p:nvSpPr>
-          <p:cNvPr id="5" name="Oval 4">
-            <a:extLst>
-              <a:ext uri="{FF2B5EF4-FFF2-40B4-BE49-F238E27FC236}">
-                <a16:creationId xmlns:a16="http://schemas.microsoft.com/office/drawing/2014/main" id="{7818E87D-F880-9247-BAF6-1BB3CE993A11}"/>
-              </a:ext>
-            </a:extLst>
-          </p:cNvPr>
-          <p:cNvSpPr/>
-          <p:nvPr/>
-        </p:nvSpPr>
-        <p:spPr>
-          <a:xfrm>
-            <a:off x="4881154" y="4565640"/>
-            <a:ext cx="2429691" cy="2146060"/>
-          </a:xfrm>
-          <a:prstGeom prst="ellipse">
-            <a:avLst/>
-          </a:prstGeom>
-          <a:noFill/>
-          <a:ln w="63500">
-            <a:solidFill>
-              <a:srgbClr val="C00000"/>
-            </a:solidFill>
-            <a:prstDash val="solid"/>
-            <a:tailEnd type="triangle" w="lg" len="lg"/>
-          </a:ln>
-        </p:spPr>
-        <p:style>
-          <a:lnRef idx="2">
-            <a:schemeClr val="accent1">
-              <a:shade val="50000"/>
-            </a:schemeClr>
-          </a:lnRef>
-          <a:fillRef idx="1">
-            <a:schemeClr val="accent1"/>
-          </a:fillRef>
-          <a:effectRef idx="0">
-            <a:schemeClr val="accent1"/>
-          </a:effectRef>
-          <a:fontRef idx="minor">
-            <a:schemeClr val="lt1"/>
-          </a:fontRef>
-        </p:style>
-        <p:txBody>
-          <a:bodyPr rtlCol="0" anchor="ctr"/>
-          <a:lstStyle/>
-          <a:p>
-            <a:pPr algn="ctr"/>
-            <a:endParaRPr lang="en-US" sz="2800" dirty="0">
-              <a:solidFill>
-                <a:schemeClr val="tx1"/>
-              </a:solidFill>
-              <a:latin typeface="Helvetica" pitchFamily="2" charset="0"/>
-            </a:endParaRPr>
+              <a:t>Important connections to sched literature (e.g., job scheduling)</a:t>
+            </a:r>
+          </a:p>
+          <a:p>
+            <a:endParaRPr lang="en-US" dirty="0"/>
+          </a:p>
+          <a:p>
+            <a:r>
+              <a:rPr lang="en-US" dirty="0"/>
+              <a:t>Scheduling algorithms influence many daily life decisions </a:t>
+            </a:r>
+            <a:r>
+              <a:rPr lang="en-US" dirty="0">
+                <a:sym typeface="Wingdings" pitchFamily="2" charset="2"/>
+              </a:rPr>
+              <a:t></a:t>
+            </a:r>
+            <a:endParaRPr lang="en-US" dirty="0"/>
+          </a:p>
+          <a:p>
+            <a:endParaRPr lang="en-US" dirty="0"/>
           </a:p>
         </p:txBody>
       </p:sp>
     </p:spTree>
     <p:extLst>
       <p:ext uri="{BB962C8B-B14F-4D97-AF65-F5344CB8AC3E}">
-        <p14:creationId xmlns:p14="http://schemas.microsoft.com/office/powerpoint/2010/main" val="31011709"/>
+        <p14:creationId xmlns:p14="http://schemas.microsoft.com/office/powerpoint/2010/main" val="3788514520"/>
       </p:ext>
     </p:extLst>
   </p:cSld>
@@ -12054,86 +11669,6 @@
       </p:grpSpPr>
       <p:sp>
         <p:nvSpPr>
-          <p:cNvPr id="2" name="Title 1">
-            <a:extLst>
-              <a:ext uri="{FF2B5EF4-FFF2-40B4-BE49-F238E27FC236}">
-                <a16:creationId xmlns:a16="http://schemas.microsoft.com/office/drawing/2014/main" id="{AA2C48F8-5C09-FE40-BDAF-8AF11BEF9149}"/>
-              </a:ext>
-            </a:extLst>
-          </p:cNvPr>
-          <p:cNvSpPr>
-            <a:spLocks noGrp="1"/>
-          </p:cNvSpPr>
-          <p:nvPr>
-            <p:ph type="title"/>
-          </p:nvPr>
-        </p:nvSpPr>
-        <p:spPr/>
-        <p:txBody>
-          <a:bodyPr/>
-          <a:lstStyle/>
-          <a:p>
-            <a:endParaRPr lang="en-US"/>
-          </a:p>
-        </p:txBody>
-      </p:sp>
-      <p:sp>
-        <p:nvSpPr>
-          <p:cNvPr id="3" name="Content Placeholder 2">
-            <a:extLst>
-              <a:ext uri="{FF2B5EF4-FFF2-40B4-BE49-F238E27FC236}">
-                <a16:creationId xmlns:a16="http://schemas.microsoft.com/office/drawing/2014/main" id="{5BA2EF6D-2B57-2344-8AA1-7634C38F1B08}"/>
-              </a:ext>
-            </a:extLst>
-          </p:cNvPr>
-          <p:cNvSpPr>
-            <a:spLocks noGrp="1"/>
-          </p:cNvSpPr>
-          <p:nvPr>
-            <p:ph idx="1"/>
-          </p:nvPr>
-        </p:nvSpPr>
-        <p:spPr/>
-        <p:txBody>
-          <a:bodyPr/>
-          <a:lstStyle/>
-          <a:p>
-            <a:endParaRPr lang="en-US"/>
-          </a:p>
-        </p:txBody>
-      </p:sp>
-    </p:spTree>
-    <p:extLst>
-      <p:ext uri="{BB962C8B-B14F-4D97-AF65-F5344CB8AC3E}">
-        <p14:creationId xmlns:p14="http://schemas.microsoft.com/office/powerpoint/2010/main" val="716140489"/>
-      </p:ext>
-    </p:extLst>
-  </p:cSld>
-  <p:clrMapOvr>
-    <a:masterClrMapping/>
-  </p:clrMapOvr>
-</p:sld>
-</file>
-
-<file path=ppt/slides/slide31.xml><?xml version="1.0" encoding="utf-8"?>
-<p:sld xmlns:a="http://schemas.openxmlformats.org/drawingml/2006/main" xmlns:r="http://schemas.openxmlformats.org/officeDocument/2006/relationships" xmlns:p="http://schemas.openxmlformats.org/presentationml/2006/main">
-  <p:cSld>
-    <p:spTree>
-      <p:nvGrpSpPr>
-        <p:cNvPr id="1" name=""/>
-        <p:cNvGrpSpPr/>
-        <p:nvPr/>
-      </p:nvGrpSpPr>
-      <p:grpSpPr>
-        <a:xfrm>
-          <a:off x="0" y="0"/>
-          <a:ext cx="0" cy="0"/>
-          <a:chOff x="0" y="0"/>
-          <a:chExt cx="0" cy="0"/>
-        </a:xfrm>
-      </p:grpSpPr>
-      <p:sp>
-        <p:nvSpPr>
           <p:cNvPr id="2" name="Title 1"/>
           <p:cNvSpPr>
             <a:spLocks noGrp="1"/>
@@ -12223,7 +11758,7 @@
 </p:sld>
 </file>
 
-<file path=ppt/slides/slide32.xml><?xml version="1.0" encoding="utf-8"?>
+<file path=ppt/slides/slide31.xml><?xml version="1.0" encoding="utf-8"?>
 <p:sld xmlns:a="http://schemas.openxmlformats.org/drawingml/2006/main" xmlns:r="http://schemas.openxmlformats.org/officeDocument/2006/relationships" xmlns:p="http://schemas.openxmlformats.org/presentationml/2006/main">
   <p:cSld>
     <p:spTree>
@@ -13587,7 +13122,7 @@
 </p:sld>
 </file>
 
-<file path=ppt/slides/slide33.xml><?xml version="1.0" encoding="utf-8"?>
+<file path=ppt/slides/slide32.xml><?xml version="1.0" encoding="utf-8"?>
 <p:sld xmlns:a="http://schemas.openxmlformats.org/drawingml/2006/main" xmlns:r="http://schemas.openxmlformats.org/officeDocument/2006/relationships" xmlns:p="http://schemas.openxmlformats.org/presentationml/2006/main">
   <p:cSld>
     <p:spTree>
@@ -13975,7 +13510,7 @@
 </p:sld>
 </file>
 
-<file path=ppt/slides/slide34.xml><?xml version="1.0" encoding="utf-8"?>
+<file path=ppt/slides/slide33.xml><?xml version="1.0" encoding="utf-8"?>
 <p:sld xmlns:a="http://schemas.openxmlformats.org/drawingml/2006/main" xmlns:r="http://schemas.openxmlformats.org/officeDocument/2006/relationships" xmlns:p="http://schemas.openxmlformats.org/presentationml/2006/main">
   <p:cSld>
     <p:spTree>
@@ -14048,6 +13583,66 @@
           </a:p>
         </p:txBody>
       </p:sp>
+      <p:pic>
+        <p:nvPicPr>
+          <p:cNvPr id="4" name="Picture 3">
+            <a:extLst>
+              <a:ext uri="{FF2B5EF4-FFF2-40B4-BE49-F238E27FC236}">
+                <a16:creationId xmlns:a16="http://schemas.microsoft.com/office/drawing/2014/main" id="{D4473D1B-4CE8-D842-8632-87B17CA3D9CA}"/>
+              </a:ext>
+            </a:extLst>
+          </p:cNvPr>
+          <p:cNvPicPr>
+            <a:picLocks noChangeAspect="1"/>
+          </p:cNvPicPr>
+          <p:nvPr/>
+        </p:nvPicPr>
+        <p:blipFill>
+          <a:blip r:embed="rId2"/>
+          <a:stretch>
+            <a:fillRect/>
+          </a:stretch>
+        </p:blipFill>
+        <p:spPr>
+          <a:xfrm>
+            <a:off x="522735" y="2517732"/>
+            <a:ext cx="5871712" cy="4164904"/>
+          </a:xfrm>
+          <a:prstGeom prst="rect">
+            <a:avLst/>
+          </a:prstGeom>
+        </p:spPr>
+      </p:pic>
+      <p:pic>
+        <p:nvPicPr>
+          <p:cNvPr id="5" name="Picture 4">
+            <a:extLst>
+              <a:ext uri="{FF2B5EF4-FFF2-40B4-BE49-F238E27FC236}">
+                <a16:creationId xmlns:a16="http://schemas.microsoft.com/office/drawing/2014/main" id="{9085A0EB-3C4B-3C49-8332-AF24927F1881}"/>
+              </a:ext>
+            </a:extLst>
+          </p:cNvPr>
+          <p:cNvPicPr>
+            <a:picLocks noChangeAspect="1"/>
+          </p:cNvPicPr>
+          <p:nvPr/>
+        </p:nvPicPr>
+        <p:blipFill>
+          <a:blip r:embed="rId3"/>
+          <a:stretch>
+            <a:fillRect/>
+          </a:stretch>
+        </p:blipFill>
+        <p:spPr>
+          <a:xfrm>
+            <a:off x="6394447" y="2693096"/>
+            <a:ext cx="5777358" cy="4164904"/>
+          </a:xfrm>
+          <a:prstGeom prst="rect">
+            <a:avLst/>
+          </a:prstGeom>
+        </p:spPr>
+      </p:pic>
     </p:spTree>
     <p:extLst>
       <p:ext uri="{BB962C8B-B14F-4D97-AF65-F5344CB8AC3E}">
@@ -14062,191 +13657,6 @@
 </file>
 
 <file path=ppt/slides/slide4.xml><?xml version="1.0" encoding="utf-8"?>
-<p:sld xmlns:a="http://schemas.openxmlformats.org/drawingml/2006/main" xmlns:r="http://schemas.openxmlformats.org/officeDocument/2006/relationships" xmlns:p="http://schemas.openxmlformats.org/presentationml/2006/main">
-  <p:cSld>
-    <p:spTree>
-      <p:nvGrpSpPr>
-        <p:cNvPr id="1" name=""/>
-        <p:cNvGrpSpPr/>
-        <p:nvPr/>
-      </p:nvGrpSpPr>
-      <p:grpSpPr>
-        <a:xfrm>
-          <a:off x="0" y="0"/>
-          <a:ext cx="0" cy="0"/>
-          <a:chOff x="0" y="0"/>
-          <a:chExt cx="0" cy="0"/>
-        </a:xfrm>
-      </p:grpSpPr>
-      <p:sp>
-        <p:nvSpPr>
-          <p:cNvPr id="2" name="Title 1">
-            <a:extLst>
-              <a:ext uri="{FF2B5EF4-FFF2-40B4-BE49-F238E27FC236}">
-                <a16:creationId xmlns:a16="http://schemas.microsoft.com/office/drawing/2014/main" id="{B034177D-142D-9A4A-83C1-F5C306969C1E}"/>
-              </a:ext>
-            </a:extLst>
-          </p:cNvPr>
-          <p:cNvSpPr>
-            <a:spLocks noGrp="1"/>
-          </p:cNvSpPr>
-          <p:nvPr>
-            <p:ph type="title"/>
-          </p:nvPr>
-        </p:nvSpPr>
-        <p:spPr/>
-        <p:txBody>
-          <a:bodyPr/>
-          <a:lstStyle/>
-          <a:p>
-            <a:r>
-              <a:rPr lang="en-US" dirty="0"/>
-              <a:t>Why care about packet scheduling?</a:t>
-            </a:r>
-          </a:p>
-        </p:txBody>
-      </p:sp>
-      <p:sp>
-        <p:nvSpPr>
-          <p:cNvPr id="3" name="Content Placeholder 2">
-            <a:extLst>
-              <a:ext uri="{FF2B5EF4-FFF2-40B4-BE49-F238E27FC236}">
-                <a16:creationId xmlns:a16="http://schemas.microsoft.com/office/drawing/2014/main" id="{F13E5DD5-8446-1A40-8C04-9FB9202610A8}"/>
-              </a:ext>
-            </a:extLst>
-          </p:cNvPr>
-          <p:cNvSpPr>
-            <a:spLocks noGrp="1"/>
-          </p:cNvSpPr>
-          <p:nvPr>
-            <p:ph idx="1"/>
-          </p:nvPr>
-        </p:nvSpPr>
-        <p:spPr>
-          <a:xfrm>
-            <a:off x="838200" y="1825624"/>
-            <a:ext cx="10515600" cy="5032375"/>
-          </a:xfrm>
-        </p:spPr>
-        <p:txBody>
-          <a:bodyPr>
-            <a:normAutofit/>
-          </a:bodyPr>
-          <a:lstStyle/>
-          <a:p>
-            <a:r>
-              <a:rPr lang="en-US" dirty="0"/>
-              <a:t>Significantly influences how packets are treated regardless of the endpoint transport</a:t>
-            </a:r>
-          </a:p>
-          <a:p>
-            <a:pPr lvl="1"/>
-            <a:r>
-              <a:rPr lang="en-US" dirty="0"/>
-              <a:t>Implementations of </a:t>
-            </a:r>
-            <a:r>
-              <a:rPr lang="en-US" dirty="0">
-                <a:solidFill>
-                  <a:srgbClr val="C00000"/>
-                </a:solidFill>
-              </a:rPr>
-              <a:t>Quality of Service (QoS)</a:t>
-            </a:r>
-            <a:r>
-              <a:rPr lang="en-US" dirty="0"/>
-              <a:t> within large networks</a:t>
-            </a:r>
-          </a:p>
-          <a:p>
-            <a:pPr lvl="1"/>
-            <a:r>
-              <a:rPr lang="en-US" dirty="0"/>
-              <a:t>Implications for </a:t>
-            </a:r>
-            <a:r>
-              <a:rPr lang="en-US" dirty="0">
-                <a:solidFill>
-                  <a:srgbClr val="C00000"/>
-                </a:solidFill>
-              </a:rPr>
-              <a:t>net neutrality </a:t>
-            </a:r>
-            <a:r>
-              <a:rPr lang="en-US" dirty="0"/>
-              <a:t>debates</a:t>
-            </a:r>
-          </a:p>
-          <a:p>
-            <a:endParaRPr lang="en-US" dirty="0"/>
-          </a:p>
-          <a:p>
-            <a:r>
-              <a:rPr lang="en-US" dirty="0"/>
-              <a:t>Intellectually interesting and influential (“top 10”) question</a:t>
-            </a:r>
-          </a:p>
-          <a:p>
-            <a:pPr lvl="1"/>
-            <a:r>
-              <a:rPr lang="en-US" dirty="0"/>
-              <a:t>Classic Demers et al paper (WFQ) has </a:t>
-            </a:r>
-            <a:r>
-              <a:rPr lang="en-US" dirty="0">
-                <a:solidFill>
-                  <a:srgbClr val="C00000"/>
-                </a:solidFill>
-              </a:rPr>
-              <a:t>~ 1500 </a:t>
-            </a:r>
-            <a:r>
-              <a:rPr lang="en-US" dirty="0"/>
-              <a:t>citations</a:t>
-            </a:r>
-          </a:p>
-          <a:p>
-            <a:pPr lvl="1"/>
-            <a:r>
-              <a:rPr lang="en-US" dirty="0"/>
-              <a:t>Important connections to sched literature (e.g., job scheduling)</a:t>
-            </a:r>
-          </a:p>
-          <a:p>
-            <a:endParaRPr lang="en-US" dirty="0"/>
-          </a:p>
-          <a:p>
-            <a:r>
-              <a:rPr lang="en-US" dirty="0"/>
-              <a:t>Scheduling algorithms influence many daily life decisions </a:t>
-            </a:r>
-            <a:r>
-              <a:rPr lang="en-US" dirty="0">
-                <a:sym typeface="Wingdings" pitchFamily="2" charset="2"/>
-              </a:rPr>
-              <a:t></a:t>
-            </a:r>
-            <a:endParaRPr lang="en-US" dirty="0"/>
-          </a:p>
-          <a:p>
-            <a:endParaRPr lang="en-US" dirty="0"/>
-          </a:p>
-        </p:txBody>
-      </p:sp>
-    </p:spTree>
-    <p:extLst>
-      <p:ext uri="{BB962C8B-B14F-4D97-AF65-F5344CB8AC3E}">
-        <p14:creationId xmlns:p14="http://schemas.microsoft.com/office/powerpoint/2010/main" val="3788514520"/>
-      </p:ext>
-    </p:extLst>
-  </p:cSld>
-  <p:clrMapOvr>
-    <a:masterClrMapping/>
-  </p:clrMapOvr>
-</p:sld>
-</file>
-
-<file path=ppt/slides/slide5.xml><?xml version="1.0" encoding="utf-8"?>
 <p:sld xmlns:a="http://schemas.openxmlformats.org/drawingml/2006/main" xmlns:r="http://schemas.openxmlformats.org/officeDocument/2006/relationships" xmlns:p="http://schemas.openxmlformats.org/presentationml/2006/main">
   <p:cSld>
     <p:spTree>
@@ -14466,7 +13876,7 @@
 </p:sld>
 </file>
 
-<file path=ppt/slides/slide6.xml><?xml version="1.0" encoding="utf-8"?>
+<file path=ppt/slides/slide5.xml><?xml version="1.0" encoding="utf-8"?>
 <p:sld xmlns:a="http://schemas.openxmlformats.org/drawingml/2006/main" xmlns:r="http://schemas.openxmlformats.org/officeDocument/2006/relationships" xmlns:p="http://schemas.openxmlformats.org/presentationml/2006/main">
   <p:cSld>
     <p:spTree>
@@ -14558,7 +13968,7 @@
 </p:sld>
 </file>
 
-<file path=ppt/slides/slide7.xml><?xml version="1.0" encoding="utf-8"?>
+<file path=ppt/slides/slide6.xml><?xml version="1.0" encoding="utf-8"?>
 <p:sld xmlns:a="http://schemas.openxmlformats.org/drawingml/2006/main" xmlns:r="http://schemas.openxmlformats.org/officeDocument/2006/relationships" xmlns:p="http://schemas.openxmlformats.org/presentationml/2006/main">
   <p:cSld>
     <p:spTree>
@@ -15087,7 +14497,7 @@
 </p:sld>
 </file>
 
-<file path=ppt/slides/slide8.xml><?xml version="1.0" encoding="utf-8"?>
+<file path=ppt/slides/slide7.xml><?xml version="1.0" encoding="utf-8"?>
 <p:sld xmlns:a="http://schemas.openxmlformats.org/drawingml/2006/main" xmlns:r="http://schemas.openxmlformats.org/officeDocument/2006/relationships" xmlns:p="http://schemas.openxmlformats.org/presentationml/2006/main">
   <p:cSld>
     <p:spTree>
@@ -15676,6 +15086,141 @@
 </p:sld>
 </file>
 
+<file path=ppt/slides/slide8.xml><?xml version="1.0" encoding="utf-8"?>
+<p:sld xmlns:a="http://schemas.openxmlformats.org/drawingml/2006/main" xmlns:r="http://schemas.openxmlformats.org/officeDocument/2006/relationships" xmlns:p="http://schemas.openxmlformats.org/presentationml/2006/main">
+  <p:cSld>
+    <p:spTree>
+      <p:nvGrpSpPr>
+        <p:cNvPr id="1" name=""/>
+        <p:cNvGrpSpPr/>
+        <p:nvPr/>
+      </p:nvGrpSpPr>
+      <p:grpSpPr>
+        <a:xfrm>
+          <a:off x="0" y="0"/>
+          <a:ext cx="0" cy="0"/>
+          <a:chOff x="0" y="0"/>
+          <a:chExt cx="0" cy="0"/>
+        </a:xfrm>
+      </p:grpSpPr>
+      <p:sp>
+        <p:nvSpPr>
+          <p:cNvPr id="23553" name="Title 1"/>
+          <p:cNvSpPr>
+            <a:spLocks noGrp="1"/>
+          </p:cNvSpPr>
+          <p:nvPr>
+            <p:ph type="title"/>
+          </p:nvPr>
+        </p:nvSpPr>
+        <p:spPr/>
+        <p:txBody>
+          <a:bodyPr/>
+          <a:lstStyle/>
+          <a:p>
+            <a:r>
+              <a:rPr lang="en-US" altLang="en-US" dirty="0"/>
+              <a:t>Max-min fairness</a:t>
+            </a:r>
+          </a:p>
+        </p:txBody>
+      </p:sp>
+      <p:sp>
+        <p:nvSpPr>
+          <p:cNvPr id="23554" name="Content Placeholder 2"/>
+          <p:cNvSpPr>
+            <a:spLocks noGrp="1"/>
+          </p:cNvSpPr>
+          <p:nvPr>
+            <p:ph idx="1"/>
+          </p:nvPr>
+        </p:nvSpPr>
+        <p:spPr>
+          <a:xfrm>
+            <a:off x="838200" y="1825625"/>
+            <a:ext cx="10515600" cy="4895850"/>
+          </a:xfrm>
+        </p:spPr>
+        <p:txBody>
+          <a:bodyPr>
+            <a:normAutofit/>
+          </a:bodyPr>
+          <a:lstStyle/>
+          <a:p>
+            <a:r>
+              <a:rPr lang="en-US" altLang="en-US" dirty="0">
+                <a:solidFill>
+                  <a:srgbClr val="C00000"/>
+                </a:solidFill>
+                <a:ea typeface="ＭＳ Ｐゴシック" charset="-128"/>
+              </a:rPr>
+              <a:t>Protect the less fortunate</a:t>
+            </a:r>
+          </a:p>
+          <a:p>
+            <a:pPr lvl="1"/>
+            <a:r>
+              <a:rPr lang="en-US" altLang="en-US" dirty="0"/>
+              <a:t>Any attempt to </a:t>
+            </a:r>
+            <a:r>
+              <a:rPr lang="en-US" altLang="en-US" i="1" dirty="0"/>
+              <a:t>increase</a:t>
+            </a:r>
+            <a:r>
+              <a:rPr lang="en-US" altLang="en-US" dirty="0"/>
+              <a:t> the allocation of one user necessarily </a:t>
+            </a:r>
+            <a:r>
+              <a:rPr lang="en-US" altLang="en-US" i="1" dirty="0"/>
+              <a:t>decreases</a:t>
+            </a:r>
+            <a:r>
+              <a:rPr lang="en-US" altLang="en-US" dirty="0"/>
+              <a:t> the allocation of another user with equal or lower allocation</a:t>
+            </a:r>
+          </a:p>
+          <a:p>
+            <a:pPr lvl="1"/>
+            <a:endParaRPr lang="en-US" altLang="en-US" dirty="0"/>
+          </a:p>
+          <a:p>
+            <a:r>
+              <a:rPr lang="en-US" altLang="en-US" dirty="0">
+                <a:solidFill>
+                  <a:srgbClr val="C00000"/>
+                </a:solidFill>
+                <a:ea typeface="ＭＳ Ｐゴシック" charset="-128"/>
+              </a:rPr>
+              <a:t>Fully utilize a bottleneck resource</a:t>
+            </a:r>
+          </a:p>
+          <a:p>
+            <a:pPr lvl="1"/>
+            <a:r>
+              <a:rPr lang="en-US" altLang="en-US" dirty="0"/>
+              <a:t>If demand exceeds capacity, the link is fully used</a:t>
+            </a:r>
+          </a:p>
+          <a:p>
+            <a:pPr lvl="1"/>
+            <a:endParaRPr lang="en-US" altLang="en-US" dirty="0"/>
+          </a:p>
+        </p:txBody>
+      </p:sp>
+    </p:spTree>
+    <p:extLst>
+      <p:ext uri="{BB962C8B-B14F-4D97-AF65-F5344CB8AC3E}">
+        <p14:creationId xmlns:p14="http://schemas.microsoft.com/office/powerpoint/2010/main" val="3362382430"/>
+      </p:ext>
+    </p:extLst>
+  </p:cSld>
+  <p:clrMapOvr>
+    <a:masterClrMapping/>
+  </p:clrMapOvr>
+</p:sld>
+</file>
+
 <file path=ppt/slides/slide9.xml><?xml version="1.0" encoding="utf-8"?>
 <p:sld xmlns:a="http://schemas.openxmlformats.org/drawingml/2006/main" xmlns:r="http://schemas.openxmlformats.org/officeDocument/2006/relationships" xmlns:p="http://schemas.openxmlformats.org/presentationml/2006/main">
   <p:cSld>
@@ -15693,9 +15238,69 @@
           <a:chExt cx="0" cy="0"/>
         </a:xfrm>
       </p:grpSpPr>
-      <p:sp>
-        <p:nvSpPr>
-          <p:cNvPr id="23553" name="Title 1"/>
+      <p:pic>
+        <p:nvPicPr>
+          <p:cNvPr id="5" name="Picture 4"/>
+          <p:cNvPicPr>
+            <a:picLocks noChangeAspect="1"/>
+          </p:cNvPicPr>
+          <p:nvPr/>
+        </p:nvPicPr>
+        <p:blipFill>
+          <a:blip r:embed="rId2">
+            <a:extLst>
+              <a:ext uri="{28A0092B-C50C-407E-A947-70E740481C1C}">
+                <a14:useLocalDpi xmlns:a14="http://schemas.microsoft.com/office/drawing/2010/main" val="0"/>
+              </a:ext>
+            </a:extLst>
+          </a:blip>
+          <a:stretch>
+            <a:fillRect/>
+          </a:stretch>
+        </p:blipFill>
+        <p:spPr>
+          <a:xfrm rot="5400000">
+            <a:off x="7535079" y="3494251"/>
+            <a:ext cx="1049475" cy="1907109"/>
+          </a:xfrm>
+          <a:prstGeom prst="rect">
+            <a:avLst/>
+          </a:prstGeom>
+        </p:spPr>
+      </p:pic>
+      <p:pic>
+        <p:nvPicPr>
+          <p:cNvPr id="4" name="Picture 3"/>
+          <p:cNvPicPr>
+            <a:picLocks noChangeAspect="1"/>
+          </p:cNvPicPr>
+          <p:nvPr/>
+        </p:nvPicPr>
+        <p:blipFill>
+          <a:blip r:embed="rId2">
+            <a:extLst>
+              <a:ext uri="{28A0092B-C50C-407E-A947-70E740481C1C}">
+                <a14:useLocalDpi xmlns:a14="http://schemas.microsoft.com/office/drawing/2010/main" val="0"/>
+              </a:ext>
+            </a:extLst>
+          </a:blip>
+          <a:stretch>
+            <a:fillRect/>
+          </a:stretch>
+        </p:blipFill>
+        <p:spPr>
+          <a:xfrm rot="5400000">
+            <a:off x="1708353" y="4247536"/>
+            <a:ext cx="2492476" cy="2492476"/>
+          </a:xfrm>
+          <a:prstGeom prst="rect">
+            <a:avLst/>
+          </a:prstGeom>
+        </p:spPr>
+      </p:pic>
+      <p:sp>
+        <p:nvSpPr>
+          <p:cNvPr id="2" name="Title 1"/>
           <p:cNvSpPr>
             <a:spLocks noGrp="1"/>
           </p:cNvSpPr>
@@ -15709,15 +15314,15 @@
           <a:lstStyle/>
           <a:p>
             <a:r>
-              <a:rPr lang="en-US" altLang="en-US" dirty="0"/>
-              <a:t>Max-min fairness</a:t>
-            </a:r>
-          </a:p>
-        </p:txBody>
-      </p:sp>
-      <p:sp>
-        <p:nvSpPr>
-          <p:cNvPr id="23554" name="Content Placeholder 2"/>
+              <a:rPr lang="en-US" dirty="0"/>
+              <a:t>Max-min fairness for a single resource</a:t>
+            </a:r>
+          </a:p>
+        </p:txBody>
+      </p:sp>
+      <p:sp>
+        <p:nvSpPr>
+          <p:cNvPr id="3" name="Content Placeholder 2"/>
           <p:cNvSpPr>
             <a:spLocks noGrp="1"/>
           </p:cNvSpPr>
@@ -15728,13 +15333,11 @@
         <p:spPr>
           <a:xfrm>
             <a:off x="838200" y="1825625"/>
-            <a:ext cx="10515600" cy="4895850"/>
+            <a:ext cx="10990006" cy="4351338"/>
           </a:xfrm>
         </p:spPr>
         <p:txBody>
-          <a:bodyPr>
-            <a:normAutofit/>
-          </a:bodyPr>
+          <a:bodyPr/>
           <a:lstStyle/>
           <a:p>
             <a:r>
@@ -15744,37 +15347,23 @@
                 </a:solidFill>
                 <a:ea typeface="ＭＳ Ｐゴシック" charset="-128"/>
               </a:rPr>
-              <a:t>Protect the less fortunate</a:t>
-            </a:r>
-          </a:p>
-          <a:p>
-            <a:pPr lvl="1"/>
-            <a:r>
-              <a:rPr lang="en-US" altLang="en-US" dirty="0"/>
-              <a:t>Any attempt to </a:t>
-            </a:r>
-            <a:r>
-              <a:rPr lang="en-US" altLang="en-US" i="1" dirty="0"/>
-              <a:t>increase</a:t>
-            </a:r>
-            <a:r>
-              <a:rPr lang="en-US" altLang="en-US" dirty="0"/>
-              <a:t> the allocation of one user necessarily </a:t>
-            </a:r>
-            <a:r>
-              <a:rPr lang="en-US" altLang="en-US" i="1" dirty="0"/>
-              <a:t>decreases</a:t>
-            </a:r>
-            <a:r>
-              <a:rPr lang="en-US" altLang="en-US" dirty="0"/>
-              <a:t> the allocation of another user with equal or lower allocation</a:t>
-            </a:r>
-          </a:p>
-          <a:p>
-            <a:pPr lvl="1"/>
-            <a:endParaRPr lang="en-US" altLang="en-US" dirty="0"/>
-          </a:p>
-          <a:p>
+              <a:t>Progressive filling algorithm </a:t>
+            </a:r>
+            <a:r>
+              <a:rPr lang="en-US" altLang="en-US" dirty="0">
+                <a:ea typeface="ＭＳ Ｐゴシック" charset="-128"/>
+              </a:rPr>
+              <a:t>(also called </a:t>
+            </a:r>
+            <a:r>
+              <a:rPr lang="en-US" altLang="en-US" dirty="0" err="1">
+                <a:solidFill>
+                  <a:srgbClr val="C00000"/>
+                </a:solidFill>
+                <a:ea typeface="ＭＳ Ｐゴシック" charset="-128"/>
+              </a:rPr>
+              <a:t>waterfilling</a:t>
+            </a:r>
             <a:r>
               <a:rPr lang="en-US" altLang="en-US" dirty="0">
                 <a:solidFill>
@@ -15782,26 +15371,372 @@
                 </a:solidFill>
                 <a:ea typeface="ＭＳ Ｐゴシック" charset="-128"/>
               </a:rPr>
-              <a:t>Fully utilize a bottleneck resource</a:t>
+              <a:t>)</a:t>
             </a:r>
           </a:p>
           <a:p>
             <a:pPr lvl="1"/>
             <a:r>
               <a:rPr lang="en-US" altLang="en-US" dirty="0"/>
-              <a:t>If demand exceeds capacity, the link is fully used</a:t>
+              <a:t>Grow all rates until some users stop having demand</a:t>
             </a:r>
           </a:p>
           <a:p>
             <a:pPr lvl="1"/>
-            <a:endParaRPr lang="en-US" altLang="en-US" dirty="0"/>
+            <a:r>
+              <a:rPr lang="en-US" altLang="en-US" dirty="0"/>
+              <a:t>Continue increasing all remaining rates until link is fully utilized</a:t>
+            </a:r>
+          </a:p>
+          <a:p>
+            <a:endParaRPr lang="en-US" dirty="0"/>
+          </a:p>
+          <a:p>
+            <a:r>
+              <a:rPr lang="en-US" dirty="0"/>
+              <a:t>If all users have elastic demands, single resource shared evenly</a:t>
+            </a:r>
+          </a:p>
+        </p:txBody>
+      </p:sp>
+      <p:pic>
+        <p:nvPicPr>
+          <p:cNvPr id="6" name="Picture 5"/>
+          <p:cNvPicPr>
+            <a:picLocks noChangeAspect="1"/>
+          </p:cNvPicPr>
+          <p:nvPr/>
+        </p:nvPicPr>
+        <p:blipFill>
+          <a:blip r:embed="rId2">
+            <a:extLst>
+              <a:ext uri="{28A0092B-C50C-407E-A947-70E740481C1C}">
+                <a14:useLocalDpi xmlns:a14="http://schemas.microsoft.com/office/drawing/2010/main" val="0"/>
+              </a:ext>
+            </a:extLst>
+          </a:blip>
+          <a:stretch>
+            <a:fillRect/>
+          </a:stretch>
+        </p:blipFill>
+        <p:spPr>
+          <a:xfrm rot="5400000">
+            <a:off x="7535079" y="4330992"/>
+            <a:ext cx="1049475" cy="1907109"/>
+          </a:xfrm>
+          <a:prstGeom prst="rect">
+            <a:avLst/>
+          </a:prstGeom>
+        </p:spPr>
+      </p:pic>
+      <p:pic>
+        <p:nvPicPr>
+          <p:cNvPr id="7" name="Picture 6"/>
+          <p:cNvPicPr>
+            <a:picLocks noChangeAspect="1"/>
+          </p:cNvPicPr>
+          <p:nvPr/>
+        </p:nvPicPr>
+        <p:blipFill>
+          <a:blip r:embed="rId2">
+            <a:extLst>
+              <a:ext uri="{28A0092B-C50C-407E-A947-70E740481C1C}">
+                <a14:useLocalDpi xmlns:a14="http://schemas.microsoft.com/office/drawing/2010/main" val="0"/>
+              </a:ext>
+            </a:extLst>
+          </a:blip>
+          <a:stretch>
+            <a:fillRect/>
+          </a:stretch>
+        </p:blipFill>
+        <p:spPr>
+          <a:xfrm rot="5400000">
+            <a:off x="7535079" y="5300927"/>
+            <a:ext cx="1049475" cy="1907109"/>
+          </a:xfrm>
+          <a:prstGeom prst="rect">
+            <a:avLst/>
+          </a:prstGeom>
+        </p:spPr>
+      </p:pic>
+      <p:sp>
+        <p:nvSpPr>
+          <p:cNvPr id="8" name="TextBox 7"/>
+          <p:cNvSpPr txBox="1"/>
+          <p:nvPr/>
+        </p:nvSpPr>
+        <p:spPr>
+          <a:xfrm>
+            <a:off x="1991032" y="6131409"/>
+            <a:ext cx="1976284" cy="492443"/>
+          </a:xfrm>
+          <a:prstGeom prst="rect">
+            <a:avLst/>
+          </a:prstGeom>
+          <a:noFill/>
+        </p:spPr>
+        <p:txBody>
+          <a:bodyPr wrap="square" rtlCol="0">
+            <a:spAutoFit/>
+          </a:bodyPr>
+          <a:lstStyle/>
+          <a:p>
+            <a:pPr algn="ctr"/>
+            <a:r>
+              <a:rPr lang="en-US" sz="2600" dirty="0">
+                <a:latin typeface="Helvetica" pitchFamily="2" charset="0"/>
+              </a:rPr>
+              <a:t>Link rate L</a:t>
+            </a:r>
+          </a:p>
+        </p:txBody>
+      </p:sp>
+      <p:sp>
+        <p:nvSpPr>
+          <p:cNvPr id="9" name="TextBox 8"/>
+          <p:cNvSpPr txBox="1"/>
+          <p:nvPr/>
+        </p:nvSpPr>
+        <p:spPr>
+          <a:xfrm>
+            <a:off x="9598738" y="4318402"/>
+            <a:ext cx="2081981" cy="492443"/>
+          </a:xfrm>
+          <a:prstGeom prst="rect">
+            <a:avLst/>
+          </a:prstGeom>
+          <a:noFill/>
+        </p:spPr>
+        <p:txBody>
+          <a:bodyPr wrap="square" rtlCol="0">
+            <a:spAutoFit/>
+          </a:bodyPr>
+          <a:lstStyle/>
+          <a:p>
+            <a:pPr algn="ctr"/>
+            <a:r>
+              <a:rPr lang="en-US" sz="2600" dirty="0">
+                <a:latin typeface="Helvetica" pitchFamily="2" charset="0"/>
+              </a:rPr>
+              <a:t>Link </a:t>
+            </a:r>
+            <a:r>
+              <a:rPr lang="en-US" sz="2600">
+                <a:latin typeface="Helvetica" pitchFamily="2" charset="0"/>
+              </a:rPr>
+              <a:t>rate L/N</a:t>
+            </a:r>
+            <a:endParaRPr lang="en-US" sz="2600" dirty="0">
+              <a:latin typeface="Helvetica" pitchFamily="2" charset="0"/>
+            </a:endParaRPr>
+          </a:p>
+        </p:txBody>
+      </p:sp>
+      <p:sp>
+        <p:nvSpPr>
+          <p:cNvPr id="10" name="TextBox 9"/>
+          <p:cNvSpPr txBox="1"/>
+          <p:nvPr/>
+        </p:nvSpPr>
+        <p:spPr>
+          <a:xfrm>
+            <a:off x="9598737" y="5192514"/>
+            <a:ext cx="2081981" cy="492443"/>
+          </a:xfrm>
+          <a:prstGeom prst="rect">
+            <a:avLst/>
+          </a:prstGeom>
+          <a:noFill/>
+        </p:spPr>
+        <p:txBody>
+          <a:bodyPr wrap="square" rtlCol="0">
+            <a:spAutoFit/>
+          </a:bodyPr>
+          <a:lstStyle/>
+          <a:p>
+            <a:pPr algn="ctr"/>
+            <a:r>
+              <a:rPr lang="en-US" sz="2600" dirty="0">
+                <a:latin typeface="Helvetica" pitchFamily="2" charset="0"/>
+              </a:rPr>
+              <a:t>Link </a:t>
+            </a:r>
+            <a:r>
+              <a:rPr lang="en-US" sz="2600">
+                <a:latin typeface="Helvetica" pitchFamily="2" charset="0"/>
+              </a:rPr>
+              <a:t>rate L/N</a:t>
+            </a:r>
+            <a:endParaRPr lang="en-US" sz="2600" dirty="0">
+              <a:latin typeface="Helvetica" pitchFamily="2" charset="0"/>
+            </a:endParaRPr>
+          </a:p>
+        </p:txBody>
+      </p:sp>
+      <p:sp>
+        <p:nvSpPr>
+          <p:cNvPr id="11" name="TextBox 10"/>
+          <p:cNvSpPr txBox="1"/>
+          <p:nvPr/>
+        </p:nvSpPr>
+        <p:spPr>
+          <a:xfrm>
+            <a:off x="9598737" y="6108483"/>
+            <a:ext cx="2081981" cy="492443"/>
+          </a:xfrm>
+          <a:prstGeom prst="rect">
+            <a:avLst/>
+          </a:prstGeom>
+          <a:noFill/>
+        </p:spPr>
+        <p:txBody>
+          <a:bodyPr wrap="square" rtlCol="0">
+            <a:spAutoFit/>
+          </a:bodyPr>
+          <a:lstStyle/>
+          <a:p>
+            <a:pPr algn="ctr"/>
+            <a:r>
+              <a:rPr lang="en-US" sz="2600" dirty="0">
+                <a:latin typeface="Helvetica" pitchFamily="2" charset="0"/>
+              </a:rPr>
+              <a:t>Link </a:t>
+            </a:r>
+            <a:r>
+              <a:rPr lang="en-US" sz="2600">
+                <a:latin typeface="Helvetica" pitchFamily="2" charset="0"/>
+              </a:rPr>
+              <a:t>rate L/N</a:t>
+            </a:r>
+            <a:endParaRPr lang="en-US" sz="2600" dirty="0">
+              <a:latin typeface="Helvetica" pitchFamily="2" charset="0"/>
+            </a:endParaRPr>
+          </a:p>
+        </p:txBody>
+      </p:sp>
+      <p:sp>
+        <p:nvSpPr>
+          <p:cNvPr id="12" name="Right Arrow 11"/>
+          <p:cNvSpPr/>
+          <p:nvPr/>
+        </p:nvSpPr>
+        <p:spPr>
+          <a:xfrm>
+            <a:off x="5014452" y="5401594"/>
+            <a:ext cx="1318751" cy="656299"/>
+          </a:xfrm>
+          <a:prstGeom prst="rightArrow">
+            <a:avLst/>
+          </a:prstGeom>
+          <a:noFill/>
+          <a:ln w="50800">
+            <a:solidFill>
+              <a:schemeClr val="tx1"/>
+            </a:solidFill>
+          </a:ln>
+        </p:spPr>
+        <p:style>
+          <a:lnRef idx="2">
+            <a:schemeClr val="accent1">
+              <a:shade val="50000"/>
+            </a:schemeClr>
+          </a:lnRef>
+          <a:fillRef idx="1">
+            <a:schemeClr val="accent1"/>
+          </a:fillRef>
+          <a:effectRef idx="0">
+            <a:schemeClr val="accent1"/>
+          </a:effectRef>
+          <a:fontRef idx="minor">
+            <a:schemeClr val="lt1"/>
+          </a:fontRef>
+        </p:style>
+        <p:txBody>
+          <a:bodyPr rtlCol="0" anchor="ctr"/>
+          <a:lstStyle/>
+          <a:p>
+            <a:pPr algn="ctr"/>
+            <a:endParaRPr lang="en-US"/>
+          </a:p>
+        </p:txBody>
+      </p:sp>
+      <p:sp>
+        <p:nvSpPr>
+          <p:cNvPr id="13" name="TextBox 12"/>
+          <p:cNvSpPr txBox="1"/>
+          <p:nvPr/>
+        </p:nvSpPr>
+        <p:spPr>
+          <a:xfrm>
+            <a:off x="4689987" y="4468761"/>
+            <a:ext cx="1843548" cy="892552"/>
+          </a:xfrm>
+          <a:prstGeom prst="rect">
+            <a:avLst/>
+          </a:prstGeom>
+          <a:noFill/>
+        </p:spPr>
+        <p:txBody>
+          <a:bodyPr wrap="square" rtlCol="0">
+            <a:spAutoFit/>
+          </a:bodyPr>
+          <a:lstStyle/>
+          <a:p>
+            <a:pPr algn="ctr"/>
+            <a:r>
+              <a:rPr lang="en-US" sz="2600" dirty="0">
+                <a:latin typeface="Helvetica" charset="0"/>
+                <a:ea typeface="Helvetica" charset="0"/>
+                <a:cs typeface="Helvetica" charset="0"/>
+              </a:rPr>
+              <a:t>N elastic users</a:t>
+            </a:r>
+          </a:p>
+        </p:txBody>
+      </p:sp>
+      <p:sp>
+        <p:nvSpPr>
+          <p:cNvPr id="14" name="TextBox 13"/>
+          <p:cNvSpPr txBox="1"/>
+          <p:nvPr/>
+        </p:nvSpPr>
+        <p:spPr>
+          <a:xfrm>
+            <a:off x="7369269" y="5650280"/>
+            <a:ext cx="1410584" cy="492443"/>
+          </a:xfrm>
+          <a:prstGeom prst="rect">
+            <a:avLst/>
+          </a:prstGeom>
+          <a:noFill/>
+        </p:spPr>
+        <p:txBody>
+          <a:bodyPr wrap="square" rtlCol="0">
+            <a:spAutoFit/>
+          </a:bodyPr>
+          <a:lstStyle/>
+          <a:p>
+            <a:pPr algn="ctr"/>
+            <a:r>
+              <a:rPr lang="is-IS" sz="2600">
+                <a:latin typeface="Helvetica" charset="0"/>
+                <a:ea typeface="Helvetica" charset="0"/>
+                <a:cs typeface="Helvetica" charset="0"/>
+              </a:rPr>
+              <a:t>…</a:t>
+            </a:r>
+            <a:endParaRPr lang="en-US" sz="2600" dirty="0">
+              <a:latin typeface="Helvetica" charset="0"/>
+              <a:ea typeface="Helvetica" charset="0"/>
+              <a:cs typeface="Helvetica" charset="0"/>
+            </a:endParaRPr>
           </a:p>
         </p:txBody>
       </p:sp>
     </p:spTree>
     <p:extLst>
       <p:ext uri="{BB962C8B-B14F-4D97-AF65-F5344CB8AC3E}">
-        <p14:creationId xmlns:p14="http://schemas.microsoft.com/office/powerpoint/2010/main" val="3362382430"/>
+        <p14:creationId xmlns:p14="http://schemas.microsoft.com/office/powerpoint/2010/main" val="1619207882"/>
       </p:ext>
     </p:extLst>
   </p:cSld>

</xml_diff>